<commit_message>
Shifted NV UI Upwards Modified Troy's ppt slide
</commit_message>
<xml_diff>
--- a/State Penitentiary 3.pptx
+++ b/State Penitentiary 3.pptx
@@ -6054,11 +6054,7 @@
           <a:p>
             <a:r>
               <a:rPr lang="en-SG" dirty="0" smtClean="0"/>
-              <a:t>Task break </a:t>
-            </a:r>
-            <a:r>
-              <a:rPr lang="en-SG" dirty="0" smtClean="0"/>
-              <a:t>down - Glenn</a:t>
+              <a:t>Task break down - Glenn</a:t>
             </a:r>
             <a:endParaRPr lang="en-SG" dirty="0"/>
           </a:p>
@@ -6137,11 +6133,7 @@
           <a:p>
             <a:r>
               <a:rPr lang="en-SG" dirty="0" smtClean="0"/>
-              <a:t>Task break </a:t>
-            </a:r>
-            <a:r>
-              <a:rPr lang="en-SG" dirty="0" smtClean="0"/>
-              <a:t>down - Gerald</a:t>
+              <a:t>Task break down - Gerald</a:t>
             </a:r>
             <a:endParaRPr lang="en-SG" dirty="0"/>
           </a:p>
@@ -6220,32 +6212,163 @@
           <a:p>
             <a:r>
               <a:rPr lang="en-SG" dirty="0" smtClean="0"/>
-              <a:t>Task break </a:t>
-            </a:r>
+              <a:t>Task break down - Troy</a:t>
+            </a:r>
+            <a:endParaRPr lang="en-SG" dirty="0"/>
+          </a:p>
+        </p:txBody>
+      </p:sp>
+      <p:sp>
+        <p:nvSpPr>
+          <p:cNvPr id="3" name="Content Placeholder 2"/>
+          <p:cNvSpPr>
+            <a:spLocks noGrp="1"/>
+          </p:cNvSpPr>
+          <p:nvPr>
+            <p:ph idx="1"/>
+          </p:nvPr>
+        </p:nvSpPr>
+        <p:spPr>
+          <a:xfrm>
+            <a:off x="1103313" y="2052918"/>
+            <a:ext cx="7383864" cy="4195481"/>
+          </a:xfrm>
+        </p:spPr>
+        <p:txBody>
+          <a:bodyPr>
+            <a:normAutofit fontScale="92500" lnSpcReduction="10000"/>
+          </a:bodyPr>
+          <a:lstStyle/>
+          <a:p>
             <a:r>
               <a:rPr lang="en-SG" dirty="0" smtClean="0"/>
-              <a:t>down - Troy</a:t>
-            </a:r>
+              <a:t>Read From Text File		</a:t>
+            </a:r>
+          </a:p>
+          <a:p>
+            <a:r>
+              <a:rPr lang="en-SG" dirty="0" smtClean="0"/>
+              <a:t>Human Models</a:t>
+            </a:r>
+          </a:p>
+          <a:p>
+            <a:r>
+              <a:rPr lang="en-SG" dirty="0" smtClean="0"/>
+              <a:t>Level 4 Design</a:t>
+            </a:r>
+          </a:p>
+          <a:p>
+            <a:r>
+              <a:rPr lang="en-SG" dirty="0" smtClean="0"/>
+              <a:t>Interactions</a:t>
+            </a:r>
+          </a:p>
+          <a:p>
+            <a:pPr lvl="1">
+              <a:buFont typeface="Wingdings" panose="05000000000000000000" pitchFamily="2" charset="2"/>
+              <a:buChar char="q"/>
+            </a:pPr>
+            <a:r>
+              <a:rPr lang="en-SG" dirty="0" smtClean="0"/>
+              <a:t>Item Pickup</a:t>
+            </a:r>
+          </a:p>
+          <a:p>
+            <a:pPr lvl="1">
+              <a:buFont typeface="Wingdings" panose="05000000000000000000" pitchFamily="2" charset="2"/>
+              <a:buChar char="q"/>
+            </a:pPr>
+            <a:r>
+              <a:rPr lang="en-SG" dirty="0" smtClean="0"/>
+              <a:t>Unlocking Doors</a:t>
+            </a:r>
+          </a:p>
+          <a:p>
+            <a:r>
+              <a:rPr lang="en-SG" dirty="0" smtClean="0"/>
+              <a:t>Features</a:t>
+            </a:r>
+          </a:p>
+          <a:p>
+            <a:pPr lvl="1">
+              <a:buFont typeface="Wingdings" panose="05000000000000000000" pitchFamily="2" charset="2"/>
+              <a:buChar char="q"/>
+            </a:pPr>
+            <a:r>
+              <a:rPr lang="en-SG" dirty="0" smtClean="0"/>
+              <a:t>Key card-locked doors</a:t>
+            </a:r>
+          </a:p>
+          <a:p>
+            <a:pPr lvl="1">
+              <a:buFont typeface="Wingdings" panose="05000000000000000000" pitchFamily="2" charset="2"/>
+              <a:buChar char="q"/>
+            </a:pPr>
+            <a:r>
+              <a:rPr lang="en-SG" dirty="0" smtClean="0"/>
+              <a:t>Key cards</a:t>
+            </a:r>
+          </a:p>
+          <a:p>
+            <a:pPr lvl="1">
+              <a:buFont typeface="Wingdings" panose="05000000000000000000" pitchFamily="2" charset="2"/>
+              <a:buChar char="q"/>
+            </a:pPr>
+            <a:r>
+              <a:rPr lang="en-SG" dirty="0" smtClean="0"/>
+              <a:t>Dialogue</a:t>
+            </a:r>
+          </a:p>
+          <a:p>
+            <a:pPr lvl="1">
+              <a:buFont typeface="Wingdings" panose="05000000000000000000" pitchFamily="2" charset="2"/>
+              <a:buChar char="q"/>
+            </a:pPr>
+            <a:r>
+              <a:rPr lang="en-SG" dirty="0" smtClean="0"/>
+              <a:t>Night Vision Goggles</a:t>
+            </a:r>
+          </a:p>
+          <a:p>
+            <a:pPr marL="457200" lvl="1" indent="0">
+              <a:buNone/>
+            </a:pPr>
+            <a:endParaRPr lang="en-SG" dirty="0" smtClean="0"/>
+          </a:p>
+          <a:p>
+            <a:pPr lvl="1">
+              <a:buFont typeface="Wingdings" panose="05000000000000000000" pitchFamily="2" charset="2"/>
+              <a:buChar char="q"/>
+            </a:pPr>
             <a:endParaRPr lang="en-SG" dirty="0"/>
           </a:p>
-        </p:txBody>
-      </p:sp>
-      <p:sp>
-        <p:nvSpPr>
-          <p:cNvPr id="3" name="Content Placeholder 2"/>
-          <p:cNvSpPr>
-            <a:spLocks noGrp="1"/>
-          </p:cNvSpPr>
-          <p:nvPr>
-            <p:ph idx="1"/>
-          </p:nvPr>
-        </p:nvSpPr>
-        <p:spPr/>
-        <p:txBody>
-          <a:bodyPr/>
-          <a:lstStyle/>
-          <a:p>
-            <a:endParaRPr lang="en-SG"/>
+          <a:p>
+            <a:pPr lvl="1">
+              <a:buFont typeface="Wingdings" panose="05000000000000000000" pitchFamily="2" charset="2"/>
+              <a:buChar char="q"/>
+            </a:pPr>
+            <a:endParaRPr lang="en-SG" dirty="0" smtClean="0"/>
+          </a:p>
+          <a:p>
+            <a:pPr marL="457200" lvl="1" indent="0">
+              <a:buNone/>
+            </a:pPr>
+            <a:endParaRPr lang="en-SG" dirty="0"/>
+          </a:p>
+          <a:p>
+            <a:pPr marL="457200" lvl="1" indent="0">
+              <a:buNone/>
+            </a:pPr>
+            <a:endParaRPr lang="en-SG" dirty="0" smtClean="0"/>
+          </a:p>
+          <a:p>
+            <a:pPr marL="457200" lvl="1" indent="0">
+              <a:buNone/>
+            </a:pPr>
+            <a:endParaRPr lang="en-SG" dirty="0" smtClean="0"/>
+          </a:p>
+          <a:p>
+            <a:endParaRPr lang="en-SG" dirty="0"/>
           </a:p>
         </p:txBody>
       </p:sp>
@@ -6992,6 +7115,12 @@
               <a:t>Dialogue system</a:t>
             </a:r>
           </a:p>
+          <a:p>
+            <a:r>
+              <a:rPr lang="en-SG" dirty="0" smtClean="0"/>
+              <a:t>Key cards and doors</a:t>
+            </a:r>
+          </a:p>
         </p:txBody>
       </p:sp>
     </p:spTree>
@@ -7155,7 +7284,6 @@
               <a:rPr lang="en-SG" dirty="0"/>
               <a:t>warning HUD</a:t>
             </a:r>
-            <a:endParaRPr lang="en-SG" dirty="0"/>
           </a:p>
         </p:txBody>
       </p:sp>
@@ -7411,11 +7539,7 @@
           <a:p>
             <a:r>
               <a:rPr lang="en-SG" dirty="0" smtClean="0"/>
-              <a:t>Task break </a:t>
-            </a:r>
-            <a:r>
-              <a:rPr lang="en-SG" dirty="0" smtClean="0"/>
-              <a:t>down - Edmund</a:t>
+              <a:t>Task break down - Edmund</a:t>
             </a:r>
             <a:endParaRPr lang="en-SG" dirty="0"/>
           </a:p>
@@ -7493,7 +7617,6 @@
               <a:rPr lang="en-SG" dirty="0" smtClean="0"/>
               <a:t>Pathfinding</a:t>
             </a:r>
-            <a:endParaRPr lang="en-SG" dirty="0" smtClean="0"/>
           </a:p>
           <a:p>
             <a:r>

</xml_diff>

<commit_message>
Documentation ===== - Documentation completed
</commit_message>
<xml_diff>
--- a/State Penitentiary 3.pptx
+++ b/State Penitentiary 3.pptx
@@ -321,7 +321,7 @@
           <a:p>
             <a:fld id="{4AAD347D-5ACD-4C99-B74B-A9C85AD731AF}" type="datetimeFigureOut">
               <a:rPr lang="en-US" dirty="0"/>
-              <a:t>9/2/2015</a:t>
+              <a:t>02/09/2015</a:t>
             </a:fld>
             <a:endParaRPr lang="en-US" dirty="0"/>
           </a:p>
@@ -591,7 +591,7 @@
           <a:p>
             <a:fld id="{4509A250-FF31-4206-8172-F9D3106AACB1}" type="datetimeFigureOut">
               <a:rPr lang="en-US" dirty="0"/>
-              <a:t>9/2/2015</a:t>
+              <a:t>02/09/2015</a:t>
             </a:fld>
             <a:endParaRPr lang="en-US" dirty="0"/>
           </a:p>
@@ -780,7 +780,7 @@
           <a:p>
             <a:fld id="{4509A250-FF31-4206-8172-F9D3106AACB1}" type="datetimeFigureOut">
               <a:rPr lang="en-US" dirty="0"/>
-              <a:t>9/2/2015</a:t>
+              <a:t>02/09/2015</a:t>
             </a:fld>
             <a:endParaRPr lang="en-US" dirty="0"/>
           </a:p>
@@ -1043,7 +1043,7 @@
           <a:p>
             <a:fld id="{4509A250-FF31-4206-8172-F9D3106AACB1}" type="datetimeFigureOut">
               <a:rPr lang="en-US" dirty="0"/>
-              <a:t>9/2/2015</a:t>
+              <a:t>02/09/2015</a:t>
             </a:fld>
             <a:endParaRPr lang="en-US" dirty="0"/>
           </a:p>
@@ -1370,7 +1370,7 @@
           <a:p>
             <a:fld id="{4509A250-FF31-4206-8172-F9D3106AACB1}" type="datetimeFigureOut">
               <a:rPr lang="en-US" dirty="0"/>
-              <a:t>9/2/2015</a:t>
+              <a:t>02/09/2015</a:t>
             </a:fld>
             <a:endParaRPr lang="en-US" dirty="0"/>
           </a:p>
@@ -1975,7 +1975,7 @@
           <a:p>
             <a:fld id="{4509A250-FF31-4206-8172-F9D3106AACB1}" type="datetimeFigureOut">
               <a:rPr lang="en-US" dirty="0"/>
-              <a:t>9/2/2015</a:t>
+              <a:t>02/09/2015</a:t>
             </a:fld>
             <a:endParaRPr lang="en-US" dirty="0"/>
           </a:p>
@@ -2817,7 +2817,7 @@
           <a:p>
             <a:fld id="{4509A250-FF31-4206-8172-F9D3106AACB1}" type="datetimeFigureOut">
               <a:rPr lang="en-US" dirty="0"/>
-              <a:t>9/2/2015</a:t>
+              <a:t>02/09/2015</a:t>
             </a:fld>
             <a:endParaRPr lang="en-US" dirty="0"/>
           </a:p>
@@ -2982,7 +2982,7 @@
           <a:p>
             <a:fld id="{4509A250-FF31-4206-8172-F9D3106AACB1}" type="datetimeFigureOut">
               <a:rPr lang="en-US" dirty="0"/>
-              <a:t>9/2/2015</a:t>
+              <a:t>02/09/2015</a:t>
             </a:fld>
             <a:endParaRPr lang="en-US" dirty="0"/>
           </a:p>
@@ -3157,7 +3157,7 @@
           <a:p>
             <a:fld id="{4509A250-FF31-4206-8172-F9D3106AACB1}" type="datetimeFigureOut">
               <a:rPr lang="en-US" dirty="0"/>
-              <a:t>9/2/2015</a:t>
+              <a:t>02/09/2015</a:t>
             </a:fld>
             <a:endParaRPr lang="en-US" dirty="0"/>
           </a:p>
@@ -3322,7 +3322,7 @@
           <a:p>
             <a:fld id="{4509A250-FF31-4206-8172-F9D3106AACB1}" type="datetimeFigureOut">
               <a:rPr lang="en-US" dirty="0"/>
-              <a:t>9/2/2015</a:t>
+              <a:t>02/09/2015</a:t>
             </a:fld>
             <a:endParaRPr lang="en-US" dirty="0"/>
           </a:p>
@@ -3561,7 +3561,7 @@
           <a:p>
             <a:fld id="{4509A250-FF31-4206-8172-F9D3106AACB1}" type="datetimeFigureOut">
               <a:rPr lang="en-US" dirty="0"/>
-              <a:t>9/2/2015</a:t>
+              <a:t>02/09/2015</a:t>
             </a:fld>
             <a:endParaRPr lang="en-US" dirty="0"/>
           </a:p>
@@ -3848,7 +3848,7 @@
           <a:p>
             <a:fld id="{4509A250-FF31-4206-8172-F9D3106AACB1}" type="datetimeFigureOut">
               <a:rPr lang="en-US" dirty="0"/>
-              <a:t>9/2/2015</a:t>
+              <a:t>02/09/2015</a:t>
             </a:fld>
             <a:endParaRPr lang="en-US" dirty="0"/>
           </a:p>
@@ -4281,7 +4281,7 @@
           <a:p>
             <a:fld id="{4509A250-FF31-4206-8172-F9D3106AACB1}" type="datetimeFigureOut">
               <a:rPr lang="en-US" dirty="0"/>
-              <a:t>9/2/2015</a:t>
+              <a:t>02/09/2015</a:t>
             </a:fld>
             <a:endParaRPr lang="en-US" dirty="0"/>
           </a:p>
@@ -4394,7 +4394,7 @@
           <a:p>
             <a:fld id="{4509A250-FF31-4206-8172-F9D3106AACB1}" type="datetimeFigureOut">
               <a:rPr lang="en-US" dirty="0"/>
-              <a:t>9/2/2015</a:t>
+              <a:t>02/09/2015</a:t>
             </a:fld>
             <a:endParaRPr lang="en-US" dirty="0"/>
           </a:p>
@@ -4484,7 +4484,7 @@
           <a:p>
             <a:fld id="{4509A250-FF31-4206-8172-F9D3106AACB1}" type="datetimeFigureOut">
               <a:rPr lang="en-US" dirty="0"/>
-              <a:t>9/2/2015</a:t>
+              <a:t>02/09/2015</a:t>
             </a:fld>
             <a:endParaRPr lang="en-US" dirty="0"/>
           </a:p>
@@ -4758,7 +4758,7 @@
           <a:p>
             <a:fld id="{4509A250-FF31-4206-8172-F9D3106AACB1}" type="datetimeFigureOut">
               <a:rPr lang="en-US" dirty="0"/>
-              <a:t>9/2/2015</a:t>
+              <a:t>02/09/2015</a:t>
             </a:fld>
             <a:endParaRPr lang="en-US" dirty="0"/>
           </a:p>
@@ -5028,7 +5028,7 @@
           <a:p>
             <a:fld id="{4509A250-FF31-4206-8172-F9D3106AACB1}" type="datetimeFigureOut">
               <a:rPr lang="en-US" dirty="0"/>
-              <a:t>9/2/2015</a:t>
+              <a:t>02/09/2015</a:t>
             </a:fld>
             <a:endParaRPr lang="en-US" dirty="0"/>
           </a:p>
@@ -5452,7 +5452,7 @@
           <a:p>
             <a:fld id="{4509A250-FF31-4206-8172-F9D3106AACB1}" type="datetimeFigureOut">
               <a:rPr lang="en-US" dirty="0"/>
-              <a:t>9/2/2015</a:t>
+              <a:t>02/09/2015</a:t>
             </a:fld>
             <a:endParaRPr lang="en-US" dirty="0"/>
           </a:p>
@@ -6154,6 +6154,52 @@
           <a:bodyPr/>
           <a:lstStyle/>
           <a:p>
+            <a:r>
+              <a:rPr lang="en-SG" dirty="0" err="1" smtClean="0"/>
+              <a:t>Obj</a:t>
+            </a:r>
+            <a:r>
+              <a:rPr lang="en-SG" dirty="0" smtClean="0"/>
+              <a:t> models</a:t>
+            </a:r>
+          </a:p>
+          <a:p>
+            <a:r>
+              <a:rPr lang="en-SG" dirty="0" smtClean="0"/>
+              <a:t>Sound</a:t>
+            </a:r>
+          </a:p>
+          <a:p>
+            <a:r>
+              <a:rPr lang="en-SG" dirty="0" smtClean="0"/>
+              <a:t>Level 3 design</a:t>
+            </a:r>
+          </a:p>
+          <a:p>
+            <a:r>
+              <a:rPr lang="en-SG" dirty="0" smtClean="0"/>
+              <a:t>Dynamic weather</a:t>
+            </a:r>
+          </a:p>
+          <a:p>
+            <a:r>
+              <a:rPr lang="en-SG" dirty="0" smtClean="0"/>
+              <a:t>Laser detection</a:t>
+            </a:r>
+          </a:p>
+          <a:p>
+            <a:r>
+              <a:rPr lang="en-SG" dirty="0" smtClean="0"/>
+              <a:t>Weather controlling doll</a:t>
+            </a:r>
+          </a:p>
+          <a:p>
+            <a:r>
+              <a:rPr lang="en-SG" dirty="0" smtClean="0"/>
+              <a:t>Movements</a:t>
+            </a:r>
+          </a:p>
+          <a:p>
             <a:endParaRPr lang="en-SG" dirty="0"/>
           </a:p>
         </p:txBody>

</xml_diff>

<commit_message>
Added memory leak detector
</commit_message>
<xml_diff>
--- a/State Penitentiary 3.pptx
+++ b/State Penitentiary 3.pptx
@@ -4,6 +4,9 @@
   <p:sldMasterIdLst>
     <p:sldMasterId id="2147483648" r:id="rId1"/>
   </p:sldMasterIdLst>
+  <p:notesMasterIdLst>
+    <p:notesMasterId r:id="rId17"/>
+  </p:notesMasterIdLst>
   <p:sldIdLst>
     <p:sldId id="256" r:id="rId2"/>
     <p:sldId id="267" r:id="rId3"/>
@@ -138,6 +141,1500 @@
 </p:cmAuthorLst>
 </file>
 
+<file path=ppt/notesMasters/notesMaster1.xml><?xml version="1.0" encoding="utf-8"?>
+<p:notesMaster xmlns:a="http://schemas.openxmlformats.org/drawingml/2006/main" xmlns:r="http://schemas.openxmlformats.org/officeDocument/2006/relationships" xmlns:p="http://schemas.openxmlformats.org/presentationml/2006/main">
+  <p:cSld>
+    <p:bg>
+      <p:bgRef idx="1001">
+        <a:schemeClr val="bg1"/>
+      </p:bgRef>
+    </p:bg>
+    <p:spTree>
+      <p:nvGrpSpPr>
+        <p:cNvPr id="1" name=""/>
+        <p:cNvGrpSpPr/>
+        <p:nvPr/>
+      </p:nvGrpSpPr>
+      <p:grpSpPr>
+        <a:xfrm>
+          <a:off x="0" y="0"/>
+          <a:ext cx="0" cy="0"/>
+          <a:chOff x="0" y="0"/>
+          <a:chExt cx="0" cy="0"/>
+        </a:xfrm>
+      </p:grpSpPr>
+      <p:sp>
+        <p:nvSpPr>
+          <p:cNvPr id="2" name="Header Placeholder 1"/>
+          <p:cNvSpPr>
+            <a:spLocks noGrp="1"/>
+          </p:cNvSpPr>
+          <p:nvPr>
+            <p:ph type="hdr" sz="quarter"/>
+          </p:nvPr>
+        </p:nvSpPr>
+        <p:spPr>
+          <a:xfrm>
+            <a:off x="0" y="0"/>
+            <a:ext cx="2971800" cy="458788"/>
+          </a:xfrm>
+          <a:prstGeom prst="rect">
+            <a:avLst/>
+          </a:prstGeom>
+        </p:spPr>
+        <p:txBody>
+          <a:bodyPr vert="horz" lIns="91440" tIns="45720" rIns="91440" bIns="45720" rtlCol="0"/>
+          <a:lstStyle>
+            <a:lvl1pPr algn="l">
+              <a:defRPr sz="1200"/>
+            </a:lvl1pPr>
+          </a:lstStyle>
+          <a:p>
+            <a:endParaRPr lang="en-SG"/>
+          </a:p>
+        </p:txBody>
+      </p:sp>
+      <p:sp>
+        <p:nvSpPr>
+          <p:cNvPr id="3" name="Date Placeholder 2"/>
+          <p:cNvSpPr>
+            <a:spLocks noGrp="1"/>
+          </p:cNvSpPr>
+          <p:nvPr>
+            <p:ph type="dt" idx="1"/>
+          </p:nvPr>
+        </p:nvSpPr>
+        <p:spPr>
+          <a:xfrm>
+            <a:off x="3884613" y="0"/>
+            <a:ext cx="2971800" cy="458788"/>
+          </a:xfrm>
+          <a:prstGeom prst="rect">
+            <a:avLst/>
+          </a:prstGeom>
+        </p:spPr>
+        <p:txBody>
+          <a:bodyPr vert="horz" lIns="91440" tIns="45720" rIns="91440" bIns="45720" rtlCol="0"/>
+          <a:lstStyle>
+            <a:lvl1pPr algn="r">
+              <a:defRPr sz="1200"/>
+            </a:lvl1pPr>
+          </a:lstStyle>
+          <a:p>
+            <a:fld id="{091856CB-6403-4E05-BB88-21DA8D6B6C3E}" type="datetimeFigureOut">
+              <a:rPr lang="en-SG" smtClean="0"/>
+              <a:t>2/9/2015</a:t>
+            </a:fld>
+            <a:endParaRPr lang="en-SG"/>
+          </a:p>
+        </p:txBody>
+      </p:sp>
+      <p:sp>
+        <p:nvSpPr>
+          <p:cNvPr id="4" name="Slide Image Placeholder 3"/>
+          <p:cNvSpPr>
+            <a:spLocks noGrp="1" noRot="1" noChangeAspect="1"/>
+          </p:cNvSpPr>
+          <p:nvPr>
+            <p:ph type="sldImg" idx="2"/>
+          </p:nvPr>
+        </p:nvSpPr>
+        <p:spPr>
+          <a:xfrm>
+            <a:off x="685800" y="1143000"/>
+            <a:ext cx="5486400" cy="3086100"/>
+          </a:xfrm>
+          <a:prstGeom prst="rect">
+            <a:avLst/>
+          </a:prstGeom>
+          <a:noFill/>
+          <a:ln w="12700">
+            <a:solidFill>
+              <a:prstClr val="black"/>
+            </a:solidFill>
+          </a:ln>
+        </p:spPr>
+        <p:txBody>
+          <a:bodyPr vert="horz" lIns="91440" tIns="45720" rIns="91440" bIns="45720" rtlCol="0" anchor="ctr"/>
+          <a:lstStyle/>
+          <a:p>
+            <a:endParaRPr lang="en-SG"/>
+          </a:p>
+        </p:txBody>
+      </p:sp>
+      <p:sp>
+        <p:nvSpPr>
+          <p:cNvPr id="5" name="Notes Placeholder 4"/>
+          <p:cNvSpPr>
+            <a:spLocks noGrp="1"/>
+          </p:cNvSpPr>
+          <p:nvPr>
+            <p:ph type="body" sz="quarter" idx="3"/>
+          </p:nvPr>
+        </p:nvSpPr>
+        <p:spPr>
+          <a:xfrm>
+            <a:off x="685800" y="4400550"/>
+            <a:ext cx="5486400" cy="3600450"/>
+          </a:xfrm>
+          <a:prstGeom prst="rect">
+            <a:avLst/>
+          </a:prstGeom>
+        </p:spPr>
+        <p:txBody>
+          <a:bodyPr vert="horz" lIns="91440" tIns="45720" rIns="91440" bIns="45720" rtlCol="0"/>
+          <a:lstStyle/>
+          <a:p>
+            <a:pPr lvl="0"/>
+            <a:r>
+              <a:rPr lang="en-US" smtClean="0"/>
+              <a:t>Click to edit Master text styles</a:t>
+            </a:r>
+          </a:p>
+          <a:p>
+            <a:pPr lvl="1"/>
+            <a:r>
+              <a:rPr lang="en-US" smtClean="0"/>
+              <a:t>Second level</a:t>
+            </a:r>
+          </a:p>
+          <a:p>
+            <a:pPr lvl="2"/>
+            <a:r>
+              <a:rPr lang="en-US" smtClean="0"/>
+              <a:t>Third level</a:t>
+            </a:r>
+          </a:p>
+          <a:p>
+            <a:pPr lvl="3"/>
+            <a:r>
+              <a:rPr lang="en-US" smtClean="0"/>
+              <a:t>Fourth level</a:t>
+            </a:r>
+          </a:p>
+          <a:p>
+            <a:pPr lvl="4"/>
+            <a:r>
+              <a:rPr lang="en-US" smtClean="0"/>
+              <a:t>Fifth level</a:t>
+            </a:r>
+            <a:endParaRPr lang="en-SG"/>
+          </a:p>
+        </p:txBody>
+      </p:sp>
+      <p:sp>
+        <p:nvSpPr>
+          <p:cNvPr id="6" name="Footer Placeholder 5"/>
+          <p:cNvSpPr>
+            <a:spLocks noGrp="1"/>
+          </p:cNvSpPr>
+          <p:nvPr>
+            <p:ph type="ftr" sz="quarter" idx="4"/>
+          </p:nvPr>
+        </p:nvSpPr>
+        <p:spPr>
+          <a:xfrm>
+            <a:off x="0" y="8685213"/>
+            <a:ext cx="2971800" cy="458787"/>
+          </a:xfrm>
+          <a:prstGeom prst="rect">
+            <a:avLst/>
+          </a:prstGeom>
+        </p:spPr>
+        <p:txBody>
+          <a:bodyPr vert="horz" lIns="91440" tIns="45720" rIns="91440" bIns="45720" rtlCol="0" anchor="b"/>
+          <a:lstStyle>
+            <a:lvl1pPr algn="l">
+              <a:defRPr sz="1200"/>
+            </a:lvl1pPr>
+          </a:lstStyle>
+          <a:p>
+            <a:endParaRPr lang="en-SG"/>
+          </a:p>
+        </p:txBody>
+      </p:sp>
+      <p:sp>
+        <p:nvSpPr>
+          <p:cNvPr id="7" name="Slide Number Placeholder 6"/>
+          <p:cNvSpPr>
+            <a:spLocks noGrp="1"/>
+          </p:cNvSpPr>
+          <p:nvPr>
+            <p:ph type="sldNum" sz="quarter" idx="5"/>
+          </p:nvPr>
+        </p:nvSpPr>
+        <p:spPr>
+          <a:xfrm>
+            <a:off x="3884613" y="8685213"/>
+            <a:ext cx="2971800" cy="458787"/>
+          </a:xfrm>
+          <a:prstGeom prst="rect">
+            <a:avLst/>
+          </a:prstGeom>
+        </p:spPr>
+        <p:txBody>
+          <a:bodyPr vert="horz" lIns="91440" tIns="45720" rIns="91440" bIns="45720" rtlCol="0" anchor="b"/>
+          <a:lstStyle>
+            <a:lvl1pPr algn="r">
+              <a:defRPr sz="1200"/>
+            </a:lvl1pPr>
+          </a:lstStyle>
+          <a:p>
+            <a:fld id="{4F4A94F8-4A4A-481D-8A42-FFF271D88B52}" type="slidenum">
+              <a:rPr lang="en-SG" smtClean="0"/>
+              <a:t>‹#›</a:t>
+            </a:fld>
+            <a:endParaRPr lang="en-SG"/>
+          </a:p>
+        </p:txBody>
+      </p:sp>
+    </p:spTree>
+    <p:extLst>
+      <p:ext uri="{BB962C8B-B14F-4D97-AF65-F5344CB8AC3E}">
+        <p14:creationId xmlns:p14="http://schemas.microsoft.com/office/powerpoint/2010/main" val="414520819"/>
+      </p:ext>
+    </p:extLst>
+  </p:cSld>
+  <p:clrMap bg1="lt1" tx1="dk1" bg2="lt2" tx2="dk2" accent1="accent1" accent2="accent2" accent3="accent3" accent4="accent4" accent5="accent5" accent6="accent6" hlink="hlink" folHlink="folHlink"/>
+  <p:notesStyle>
+    <a:lvl1pPr marL="0" algn="l" defTabSz="914400" rtl="0" eaLnBrk="1" latinLnBrk="0" hangingPunct="1">
+      <a:defRPr sz="1200" kern="1200">
+        <a:solidFill>
+          <a:schemeClr val="tx1"/>
+        </a:solidFill>
+        <a:latin typeface="+mn-lt"/>
+        <a:ea typeface="+mn-ea"/>
+        <a:cs typeface="+mn-cs"/>
+      </a:defRPr>
+    </a:lvl1pPr>
+    <a:lvl2pPr marL="457200" algn="l" defTabSz="914400" rtl="0" eaLnBrk="1" latinLnBrk="0" hangingPunct="1">
+      <a:defRPr sz="1200" kern="1200">
+        <a:solidFill>
+          <a:schemeClr val="tx1"/>
+        </a:solidFill>
+        <a:latin typeface="+mn-lt"/>
+        <a:ea typeface="+mn-ea"/>
+        <a:cs typeface="+mn-cs"/>
+      </a:defRPr>
+    </a:lvl2pPr>
+    <a:lvl3pPr marL="914400" algn="l" defTabSz="914400" rtl="0" eaLnBrk="1" latinLnBrk="0" hangingPunct="1">
+      <a:defRPr sz="1200" kern="1200">
+        <a:solidFill>
+          <a:schemeClr val="tx1"/>
+        </a:solidFill>
+        <a:latin typeface="+mn-lt"/>
+        <a:ea typeface="+mn-ea"/>
+        <a:cs typeface="+mn-cs"/>
+      </a:defRPr>
+    </a:lvl3pPr>
+    <a:lvl4pPr marL="1371600" algn="l" defTabSz="914400" rtl="0" eaLnBrk="1" latinLnBrk="0" hangingPunct="1">
+      <a:defRPr sz="1200" kern="1200">
+        <a:solidFill>
+          <a:schemeClr val="tx1"/>
+        </a:solidFill>
+        <a:latin typeface="+mn-lt"/>
+        <a:ea typeface="+mn-ea"/>
+        <a:cs typeface="+mn-cs"/>
+      </a:defRPr>
+    </a:lvl4pPr>
+    <a:lvl5pPr marL="1828800" algn="l" defTabSz="914400" rtl="0" eaLnBrk="1" latinLnBrk="0" hangingPunct="1">
+      <a:defRPr sz="1200" kern="1200">
+        <a:solidFill>
+          <a:schemeClr val="tx1"/>
+        </a:solidFill>
+        <a:latin typeface="+mn-lt"/>
+        <a:ea typeface="+mn-ea"/>
+        <a:cs typeface="+mn-cs"/>
+      </a:defRPr>
+    </a:lvl5pPr>
+    <a:lvl6pPr marL="2286000" algn="l" defTabSz="914400" rtl="0" eaLnBrk="1" latinLnBrk="0" hangingPunct="1">
+      <a:defRPr sz="1200" kern="1200">
+        <a:solidFill>
+          <a:schemeClr val="tx1"/>
+        </a:solidFill>
+        <a:latin typeface="+mn-lt"/>
+        <a:ea typeface="+mn-ea"/>
+        <a:cs typeface="+mn-cs"/>
+      </a:defRPr>
+    </a:lvl6pPr>
+    <a:lvl7pPr marL="2743200" algn="l" defTabSz="914400" rtl="0" eaLnBrk="1" latinLnBrk="0" hangingPunct="1">
+      <a:defRPr sz="1200" kern="1200">
+        <a:solidFill>
+          <a:schemeClr val="tx1"/>
+        </a:solidFill>
+        <a:latin typeface="+mn-lt"/>
+        <a:ea typeface="+mn-ea"/>
+        <a:cs typeface="+mn-cs"/>
+      </a:defRPr>
+    </a:lvl7pPr>
+    <a:lvl8pPr marL="3200400" algn="l" defTabSz="914400" rtl="0" eaLnBrk="1" latinLnBrk="0" hangingPunct="1">
+      <a:defRPr sz="1200" kern="1200">
+        <a:solidFill>
+          <a:schemeClr val="tx1"/>
+        </a:solidFill>
+        <a:latin typeface="+mn-lt"/>
+        <a:ea typeface="+mn-ea"/>
+        <a:cs typeface="+mn-cs"/>
+      </a:defRPr>
+    </a:lvl8pPr>
+    <a:lvl9pPr marL="3657600" algn="l" defTabSz="914400" rtl="0" eaLnBrk="1" latinLnBrk="0" hangingPunct="1">
+      <a:defRPr sz="1200" kern="1200">
+        <a:solidFill>
+          <a:schemeClr val="tx1"/>
+        </a:solidFill>
+        <a:latin typeface="+mn-lt"/>
+        <a:ea typeface="+mn-ea"/>
+        <a:cs typeface="+mn-cs"/>
+      </a:defRPr>
+    </a:lvl9pPr>
+  </p:notesStyle>
+</p:notesMaster>
+</file>
+
+<file path=ppt/notesSlides/notesSlide1.xml><?xml version="1.0" encoding="utf-8"?>
+<p:notes xmlns:a="http://schemas.openxmlformats.org/drawingml/2006/main" xmlns:r="http://schemas.openxmlformats.org/officeDocument/2006/relationships" xmlns:p="http://schemas.openxmlformats.org/presentationml/2006/main">
+  <p:cSld>
+    <p:spTree>
+      <p:nvGrpSpPr>
+        <p:cNvPr id="1" name=""/>
+        <p:cNvGrpSpPr/>
+        <p:nvPr/>
+      </p:nvGrpSpPr>
+      <p:grpSpPr>
+        <a:xfrm>
+          <a:off x="0" y="0"/>
+          <a:ext cx="0" cy="0"/>
+          <a:chOff x="0" y="0"/>
+          <a:chExt cx="0" cy="0"/>
+        </a:xfrm>
+      </p:grpSpPr>
+      <p:sp>
+        <p:nvSpPr>
+          <p:cNvPr id="2" name="Slide Image Placeholder 1"/>
+          <p:cNvSpPr>
+            <a:spLocks noGrp="1" noRot="1" noChangeAspect="1"/>
+          </p:cNvSpPr>
+          <p:nvPr>
+            <p:ph type="sldImg"/>
+          </p:nvPr>
+        </p:nvSpPr>
+        <p:spPr/>
+      </p:sp>
+      <p:sp>
+        <p:nvSpPr>
+          <p:cNvPr id="3" name="Notes Placeholder 2"/>
+          <p:cNvSpPr>
+            <a:spLocks noGrp="1"/>
+          </p:cNvSpPr>
+          <p:nvPr>
+            <p:ph type="body" idx="1"/>
+          </p:nvPr>
+        </p:nvSpPr>
+        <p:spPr/>
+        <p:txBody>
+          <a:bodyPr/>
+          <a:lstStyle/>
+          <a:p>
+            <a:r>
+              <a:rPr lang="en-SG" dirty="0" smtClean="0"/>
+              <a:t>Glenn</a:t>
+            </a:r>
+            <a:endParaRPr lang="en-SG" dirty="0"/>
+          </a:p>
+        </p:txBody>
+      </p:sp>
+      <p:sp>
+        <p:nvSpPr>
+          <p:cNvPr id="4" name="Slide Number Placeholder 3"/>
+          <p:cNvSpPr>
+            <a:spLocks noGrp="1"/>
+          </p:cNvSpPr>
+          <p:nvPr>
+            <p:ph type="sldNum" sz="quarter" idx="10"/>
+          </p:nvPr>
+        </p:nvSpPr>
+        <p:spPr/>
+        <p:txBody>
+          <a:bodyPr/>
+          <a:lstStyle/>
+          <a:p>
+            <a:fld id="{4F4A94F8-4A4A-481D-8A42-FFF271D88B52}" type="slidenum">
+              <a:rPr lang="en-SG" smtClean="0"/>
+              <a:t>3</a:t>
+            </a:fld>
+            <a:endParaRPr lang="en-SG"/>
+          </a:p>
+        </p:txBody>
+      </p:sp>
+    </p:spTree>
+    <p:extLst>
+      <p:ext uri="{BB962C8B-B14F-4D97-AF65-F5344CB8AC3E}">
+        <p14:creationId xmlns:p14="http://schemas.microsoft.com/office/powerpoint/2010/main" val="246650545"/>
+      </p:ext>
+    </p:extLst>
+  </p:cSld>
+  <p:clrMapOvr>
+    <a:masterClrMapping/>
+  </p:clrMapOvr>
+</p:notes>
+</file>
+
+<file path=ppt/notesSlides/notesSlide10.xml><?xml version="1.0" encoding="utf-8"?>
+<p:notes xmlns:a="http://schemas.openxmlformats.org/drawingml/2006/main" xmlns:r="http://schemas.openxmlformats.org/officeDocument/2006/relationships" xmlns:p="http://schemas.openxmlformats.org/presentationml/2006/main">
+  <p:cSld>
+    <p:spTree>
+      <p:nvGrpSpPr>
+        <p:cNvPr id="1" name=""/>
+        <p:cNvGrpSpPr/>
+        <p:nvPr/>
+      </p:nvGrpSpPr>
+      <p:grpSpPr>
+        <a:xfrm>
+          <a:off x="0" y="0"/>
+          <a:ext cx="0" cy="0"/>
+          <a:chOff x="0" y="0"/>
+          <a:chExt cx="0" cy="0"/>
+        </a:xfrm>
+      </p:grpSpPr>
+      <p:sp>
+        <p:nvSpPr>
+          <p:cNvPr id="2" name="Slide Image Placeholder 1"/>
+          <p:cNvSpPr>
+            <a:spLocks noGrp="1" noRot="1" noChangeAspect="1"/>
+          </p:cNvSpPr>
+          <p:nvPr>
+            <p:ph type="sldImg"/>
+          </p:nvPr>
+        </p:nvSpPr>
+        <p:spPr/>
+      </p:sp>
+      <p:sp>
+        <p:nvSpPr>
+          <p:cNvPr id="3" name="Notes Placeholder 2"/>
+          <p:cNvSpPr>
+            <a:spLocks noGrp="1"/>
+          </p:cNvSpPr>
+          <p:nvPr>
+            <p:ph type="body" idx="1"/>
+          </p:nvPr>
+        </p:nvSpPr>
+        <p:spPr/>
+        <p:txBody>
+          <a:bodyPr/>
+          <a:lstStyle/>
+          <a:p>
+            <a:r>
+              <a:rPr lang="en-SG" dirty="0" smtClean="0"/>
+              <a:t>Troy</a:t>
+            </a:r>
+            <a:endParaRPr lang="en-SG" dirty="0"/>
+          </a:p>
+        </p:txBody>
+      </p:sp>
+      <p:sp>
+        <p:nvSpPr>
+          <p:cNvPr id="4" name="Slide Number Placeholder 3"/>
+          <p:cNvSpPr>
+            <a:spLocks noGrp="1"/>
+          </p:cNvSpPr>
+          <p:nvPr>
+            <p:ph type="sldNum" sz="quarter" idx="10"/>
+          </p:nvPr>
+        </p:nvSpPr>
+        <p:spPr/>
+        <p:txBody>
+          <a:bodyPr/>
+          <a:lstStyle/>
+          <a:p>
+            <a:fld id="{4F4A94F8-4A4A-481D-8A42-FFF271D88B52}" type="slidenum">
+              <a:rPr lang="en-SG" smtClean="0"/>
+              <a:t>12</a:t>
+            </a:fld>
+            <a:endParaRPr lang="en-SG"/>
+          </a:p>
+        </p:txBody>
+      </p:sp>
+    </p:spTree>
+    <p:extLst>
+      <p:ext uri="{BB962C8B-B14F-4D97-AF65-F5344CB8AC3E}">
+        <p14:creationId xmlns:p14="http://schemas.microsoft.com/office/powerpoint/2010/main" val="2195174804"/>
+      </p:ext>
+    </p:extLst>
+  </p:cSld>
+  <p:clrMapOvr>
+    <a:masterClrMapping/>
+  </p:clrMapOvr>
+</p:notes>
+</file>
+
+<file path=ppt/notesSlides/notesSlide11.xml><?xml version="1.0" encoding="utf-8"?>
+<p:notes xmlns:a="http://schemas.openxmlformats.org/drawingml/2006/main" xmlns:r="http://schemas.openxmlformats.org/officeDocument/2006/relationships" xmlns:p="http://schemas.openxmlformats.org/presentationml/2006/main">
+  <p:cSld>
+    <p:spTree>
+      <p:nvGrpSpPr>
+        <p:cNvPr id="1" name=""/>
+        <p:cNvGrpSpPr/>
+        <p:nvPr/>
+      </p:nvGrpSpPr>
+      <p:grpSpPr>
+        <a:xfrm>
+          <a:off x="0" y="0"/>
+          <a:ext cx="0" cy="0"/>
+          <a:chOff x="0" y="0"/>
+          <a:chExt cx="0" cy="0"/>
+        </a:xfrm>
+      </p:grpSpPr>
+      <p:sp>
+        <p:nvSpPr>
+          <p:cNvPr id="2" name="Slide Image Placeholder 1"/>
+          <p:cNvSpPr>
+            <a:spLocks noGrp="1" noRot="1" noChangeAspect="1"/>
+          </p:cNvSpPr>
+          <p:nvPr>
+            <p:ph type="sldImg"/>
+          </p:nvPr>
+        </p:nvSpPr>
+        <p:spPr/>
+      </p:sp>
+      <p:sp>
+        <p:nvSpPr>
+          <p:cNvPr id="3" name="Notes Placeholder 2"/>
+          <p:cNvSpPr>
+            <a:spLocks noGrp="1"/>
+          </p:cNvSpPr>
+          <p:nvPr>
+            <p:ph type="body" idx="1"/>
+          </p:nvPr>
+        </p:nvSpPr>
+        <p:spPr/>
+        <p:txBody>
+          <a:bodyPr/>
+          <a:lstStyle/>
+          <a:p>
+            <a:r>
+              <a:rPr lang="en-SG" dirty="0" smtClean="0"/>
+              <a:t>Troy</a:t>
+            </a:r>
+            <a:endParaRPr lang="en-SG" dirty="0"/>
+          </a:p>
+        </p:txBody>
+      </p:sp>
+      <p:sp>
+        <p:nvSpPr>
+          <p:cNvPr id="4" name="Slide Number Placeholder 3"/>
+          <p:cNvSpPr>
+            <a:spLocks noGrp="1"/>
+          </p:cNvSpPr>
+          <p:nvPr>
+            <p:ph type="sldNum" sz="quarter" idx="10"/>
+          </p:nvPr>
+        </p:nvSpPr>
+        <p:spPr/>
+        <p:txBody>
+          <a:bodyPr/>
+          <a:lstStyle/>
+          <a:p>
+            <a:fld id="{4F4A94F8-4A4A-481D-8A42-FFF271D88B52}" type="slidenum">
+              <a:rPr lang="en-SG" smtClean="0"/>
+              <a:t>13</a:t>
+            </a:fld>
+            <a:endParaRPr lang="en-SG"/>
+          </a:p>
+        </p:txBody>
+      </p:sp>
+    </p:spTree>
+    <p:extLst>
+      <p:ext uri="{BB962C8B-B14F-4D97-AF65-F5344CB8AC3E}">
+        <p14:creationId xmlns:p14="http://schemas.microsoft.com/office/powerpoint/2010/main" val="4051591558"/>
+      </p:ext>
+    </p:extLst>
+  </p:cSld>
+  <p:clrMapOvr>
+    <a:masterClrMapping/>
+  </p:clrMapOvr>
+</p:notes>
+</file>
+
+<file path=ppt/notesSlides/notesSlide12.xml><?xml version="1.0" encoding="utf-8"?>
+<p:notes xmlns:a="http://schemas.openxmlformats.org/drawingml/2006/main" xmlns:r="http://schemas.openxmlformats.org/officeDocument/2006/relationships" xmlns:p="http://schemas.openxmlformats.org/presentationml/2006/main">
+  <p:cSld>
+    <p:spTree>
+      <p:nvGrpSpPr>
+        <p:cNvPr id="1" name=""/>
+        <p:cNvGrpSpPr/>
+        <p:nvPr/>
+      </p:nvGrpSpPr>
+      <p:grpSpPr>
+        <a:xfrm>
+          <a:off x="0" y="0"/>
+          <a:ext cx="0" cy="0"/>
+          <a:chOff x="0" y="0"/>
+          <a:chExt cx="0" cy="0"/>
+        </a:xfrm>
+      </p:grpSpPr>
+      <p:sp>
+        <p:nvSpPr>
+          <p:cNvPr id="2" name="Slide Image Placeholder 1"/>
+          <p:cNvSpPr>
+            <a:spLocks noGrp="1" noRot="1" noChangeAspect="1"/>
+          </p:cNvSpPr>
+          <p:nvPr>
+            <p:ph type="sldImg"/>
+          </p:nvPr>
+        </p:nvSpPr>
+        <p:spPr/>
+      </p:sp>
+      <p:sp>
+        <p:nvSpPr>
+          <p:cNvPr id="3" name="Notes Placeholder 2"/>
+          <p:cNvSpPr>
+            <a:spLocks noGrp="1"/>
+          </p:cNvSpPr>
+          <p:nvPr>
+            <p:ph type="body" idx="1"/>
+          </p:nvPr>
+        </p:nvSpPr>
+        <p:spPr/>
+        <p:txBody>
+          <a:bodyPr/>
+          <a:lstStyle/>
+          <a:p>
+            <a:r>
+              <a:rPr lang="en-SG" dirty="0" smtClean="0"/>
+              <a:t>All 4</a:t>
+            </a:r>
+            <a:endParaRPr lang="en-SG" dirty="0"/>
+          </a:p>
+        </p:txBody>
+      </p:sp>
+      <p:sp>
+        <p:nvSpPr>
+          <p:cNvPr id="4" name="Slide Number Placeholder 3"/>
+          <p:cNvSpPr>
+            <a:spLocks noGrp="1"/>
+          </p:cNvSpPr>
+          <p:nvPr>
+            <p:ph type="sldNum" sz="quarter" idx="10"/>
+          </p:nvPr>
+        </p:nvSpPr>
+        <p:spPr/>
+        <p:txBody>
+          <a:bodyPr/>
+          <a:lstStyle/>
+          <a:p>
+            <a:fld id="{4F4A94F8-4A4A-481D-8A42-FFF271D88B52}" type="slidenum">
+              <a:rPr lang="en-SG" smtClean="0"/>
+              <a:t>14</a:t>
+            </a:fld>
+            <a:endParaRPr lang="en-SG"/>
+          </a:p>
+        </p:txBody>
+      </p:sp>
+    </p:spTree>
+    <p:extLst>
+      <p:ext uri="{BB962C8B-B14F-4D97-AF65-F5344CB8AC3E}">
+        <p14:creationId xmlns:p14="http://schemas.microsoft.com/office/powerpoint/2010/main" val="1056981441"/>
+      </p:ext>
+    </p:extLst>
+  </p:cSld>
+  <p:clrMapOvr>
+    <a:masterClrMapping/>
+  </p:clrMapOvr>
+</p:notes>
+</file>
+
+<file path=ppt/notesSlides/notesSlide13.xml><?xml version="1.0" encoding="utf-8"?>
+<p:notes xmlns:a="http://schemas.openxmlformats.org/drawingml/2006/main" xmlns:r="http://schemas.openxmlformats.org/officeDocument/2006/relationships" xmlns:p="http://schemas.openxmlformats.org/presentationml/2006/main">
+  <p:cSld>
+    <p:spTree>
+      <p:nvGrpSpPr>
+        <p:cNvPr id="1" name=""/>
+        <p:cNvGrpSpPr/>
+        <p:nvPr/>
+      </p:nvGrpSpPr>
+      <p:grpSpPr>
+        <a:xfrm>
+          <a:off x="0" y="0"/>
+          <a:ext cx="0" cy="0"/>
+          <a:chOff x="0" y="0"/>
+          <a:chExt cx="0" cy="0"/>
+        </a:xfrm>
+      </p:grpSpPr>
+      <p:sp>
+        <p:nvSpPr>
+          <p:cNvPr id="2" name="Slide Image Placeholder 1"/>
+          <p:cNvSpPr>
+            <a:spLocks noGrp="1" noRot="1" noChangeAspect="1"/>
+          </p:cNvSpPr>
+          <p:nvPr>
+            <p:ph type="sldImg"/>
+          </p:nvPr>
+        </p:nvSpPr>
+        <p:spPr/>
+      </p:sp>
+      <p:sp>
+        <p:nvSpPr>
+          <p:cNvPr id="3" name="Notes Placeholder 2"/>
+          <p:cNvSpPr>
+            <a:spLocks noGrp="1"/>
+          </p:cNvSpPr>
+          <p:nvPr>
+            <p:ph type="body" idx="1"/>
+          </p:nvPr>
+        </p:nvSpPr>
+        <p:spPr/>
+        <p:txBody>
+          <a:bodyPr/>
+          <a:lstStyle/>
+          <a:p>
+            <a:r>
+              <a:rPr lang="en-SG" smtClean="0"/>
+              <a:t>All 4</a:t>
+            </a:r>
+            <a:endParaRPr lang="en-SG" dirty="0"/>
+          </a:p>
+        </p:txBody>
+      </p:sp>
+      <p:sp>
+        <p:nvSpPr>
+          <p:cNvPr id="4" name="Slide Number Placeholder 3"/>
+          <p:cNvSpPr>
+            <a:spLocks noGrp="1"/>
+          </p:cNvSpPr>
+          <p:nvPr>
+            <p:ph type="sldNum" sz="quarter" idx="10"/>
+          </p:nvPr>
+        </p:nvSpPr>
+        <p:spPr/>
+        <p:txBody>
+          <a:bodyPr/>
+          <a:lstStyle/>
+          <a:p>
+            <a:fld id="{4F4A94F8-4A4A-481D-8A42-FFF271D88B52}" type="slidenum">
+              <a:rPr lang="en-SG" smtClean="0"/>
+              <a:t>15</a:t>
+            </a:fld>
+            <a:endParaRPr lang="en-SG"/>
+          </a:p>
+        </p:txBody>
+      </p:sp>
+    </p:spTree>
+    <p:extLst>
+      <p:ext uri="{BB962C8B-B14F-4D97-AF65-F5344CB8AC3E}">
+        <p14:creationId xmlns:p14="http://schemas.microsoft.com/office/powerpoint/2010/main" val="2712344670"/>
+      </p:ext>
+    </p:extLst>
+  </p:cSld>
+  <p:clrMapOvr>
+    <a:masterClrMapping/>
+  </p:clrMapOvr>
+</p:notes>
+</file>
+
+<file path=ppt/notesSlides/notesSlide2.xml><?xml version="1.0" encoding="utf-8"?>
+<p:notes xmlns:a="http://schemas.openxmlformats.org/drawingml/2006/main" xmlns:r="http://schemas.openxmlformats.org/officeDocument/2006/relationships" xmlns:p="http://schemas.openxmlformats.org/presentationml/2006/main">
+  <p:cSld>
+    <p:spTree>
+      <p:nvGrpSpPr>
+        <p:cNvPr id="1" name=""/>
+        <p:cNvGrpSpPr/>
+        <p:nvPr/>
+      </p:nvGrpSpPr>
+      <p:grpSpPr>
+        <a:xfrm>
+          <a:off x="0" y="0"/>
+          <a:ext cx="0" cy="0"/>
+          <a:chOff x="0" y="0"/>
+          <a:chExt cx="0" cy="0"/>
+        </a:xfrm>
+      </p:grpSpPr>
+      <p:sp>
+        <p:nvSpPr>
+          <p:cNvPr id="2" name="Slide Image Placeholder 1"/>
+          <p:cNvSpPr>
+            <a:spLocks noGrp="1" noRot="1" noChangeAspect="1"/>
+          </p:cNvSpPr>
+          <p:nvPr>
+            <p:ph type="sldImg"/>
+          </p:nvPr>
+        </p:nvSpPr>
+        <p:spPr/>
+      </p:sp>
+      <p:sp>
+        <p:nvSpPr>
+          <p:cNvPr id="3" name="Notes Placeholder 2"/>
+          <p:cNvSpPr>
+            <a:spLocks noGrp="1"/>
+          </p:cNvSpPr>
+          <p:nvPr>
+            <p:ph type="body" idx="1"/>
+          </p:nvPr>
+        </p:nvSpPr>
+        <p:spPr/>
+        <p:txBody>
+          <a:bodyPr/>
+          <a:lstStyle/>
+          <a:p>
+            <a:r>
+              <a:rPr lang="en-SG" dirty="0" smtClean="0"/>
+              <a:t>Glenn</a:t>
+            </a:r>
+            <a:endParaRPr lang="en-SG" dirty="0"/>
+          </a:p>
+        </p:txBody>
+      </p:sp>
+      <p:sp>
+        <p:nvSpPr>
+          <p:cNvPr id="4" name="Slide Number Placeholder 3"/>
+          <p:cNvSpPr>
+            <a:spLocks noGrp="1"/>
+          </p:cNvSpPr>
+          <p:nvPr>
+            <p:ph type="sldNum" sz="quarter" idx="10"/>
+          </p:nvPr>
+        </p:nvSpPr>
+        <p:spPr/>
+        <p:txBody>
+          <a:bodyPr/>
+          <a:lstStyle/>
+          <a:p>
+            <a:fld id="{4F4A94F8-4A4A-481D-8A42-FFF271D88B52}" type="slidenum">
+              <a:rPr lang="en-SG" smtClean="0"/>
+              <a:t>4</a:t>
+            </a:fld>
+            <a:endParaRPr lang="en-SG"/>
+          </a:p>
+        </p:txBody>
+      </p:sp>
+    </p:spTree>
+    <p:extLst>
+      <p:ext uri="{BB962C8B-B14F-4D97-AF65-F5344CB8AC3E}">
+        <p14:creationId xmlns:p14="http://schemas.microsoft.com/office/powerpoint/2010/main" val="763071547"/>
+      </p:ext>
+    </p:extLst>
+  </p:cSld>
+  <p:clrMapOvr>
+    <a:masterClrMapping/>
+  </p:clrMapOvr>
+</p:notes>
+</file>
+
+<file path=ppt/notesSlides/notesSlide3.xml><?xml version="1.0" encoding="utf-8"?>
+<p:notes xmlns:a="http://schemas.openxmlformats.org/drawingml/2006/main" xmlns:r="http://schemas.openxmlformats.org/officeDocument/2006/relationships" xmlns:p="http://schemas.openxmlformats.org/presentationml/2006/main">
+  <p:cSld>
+    <p:spTree>
+      <p:nvGrpSpPr>
+        <p:cNvPr id="1" name=""/>
+        <p:cNvGrpSpPr/>
+        <p:nvPr/>
+      </p:nvGrpSpPr>
+      <p:grpSpPr>
+        <a:xfrm>
+          <a:off x="0" y="0"/>
+          <a:ext cx="0" cy="0"/>
+          <a:chOff x="0" y="0"/>
+          <a:chExt cx="0" cy="0"/>
+        </a:xfrm>
+      </p:grpSpPr>
+      <p:sp>
+        <p:nvSpPr>
+          <p:cNvPr id="2" name="Slide Image Placeholder 1"/>
+          <p:cNvSpPr>
+            <a:spLocks noGrp="1" noRot="1" noChangeAspect="1"/>
+          </p:cNvSpPr>
+          <p:nvPr>
+            <p:ph type="sldImg"/>
+          </p:nvPr>
+        </p:nvSpPr>
+        <p:spPr/>
+      </p:sp>
+      <p:sp>
+        <p:nvSpPr>
+          <p:cNvPr id="3" name="Notes Placeholder 2"/>
+          <p:cNvSpPr>
+            <a:spLocks noGrp="1"/>
+          </p:cNvSpPr>
+          <p:nvPr>
+            <p:ph type="body" idx="1"/>
+          </p:nvPr>
+        </p:nvSpPr>
+        <p:spPr/>
+        <p:txBody>
+          <a:bodyPr/>
+          <a:lstStyle/>
+          <a:p>
+            <a:r>
+              <a:rPr lang="en-SG" dirty="0" smtClean="0"/>
+              <a:t>Gerald</a:t>
+            </a:r>
+            <a:endParaRPr lang="en-SG" dirty="0"/>
+          </a:p>
+        </p:txBody>
+      </p:sp>
+      <p:sp>
+        <p:nvSpPr>
+          <p:cNvPr id="4" name="Slide Number Placeholder 3"/>
+          <p:cNvSpPr>
+            <a:spLocks noGrp="1"/>
+          </p:cNvSpPr>
+          <p:nvPr>
+            <p:ph type="sldNum" sz="quarter" idx="10"/>
+          </p:nvPr>
+        </p:nvSpPr>
+        <p:spPr/>
+        <p:txBody>
+          <a:bodyPr/>
+          <a:lstStyle/>
+          <a:p>
+            <a:fld id="{4F4A94F8-4A4A-481D-8A42-FFF271D88B52}" type="slidenum">
+              <a:rPr lang="en-SG" smtClean="0"/>
+              <a:t>5</a:t>
+            </a:fld>
+            <a:endParaRPr lang="en-SG"/>
+          </a:p>
+        </p:txBody>
+      </p:sp>
+    </p:spTree>
+    <p:extLst>
+      <p:ext uri="{BB962C8B-B14F-4D97-AF65-F5344CB8AC3E}">
+        <p14:creationId xmlns:p14="http://schemas.microsoft.com/office/powerpoint/2010/main" val="3728343365"/>
+      </p:ext>
+    </p:extLst>
+  </p:cSld>
+  <p:clrMapOvr>
+    <a:masterClrMapping/>
+  </p:clrMapOvr>
+</p:notes>
+</file>
+
+<file path=ppt/notesSlides/notesSlide4.xml><?xml version="1.0" encoding="utf-8"?>
+<p:notes xmlns:a="http://schemas.openxmlformats.org/drawingml/2006/main" xmlns:r="http://schemas.openxmlformats.org/officeDocument/2006/relationships" xmlns:p="http://schemas.openxmlformats.org/presentationml/2006/main">
+  <p:cSld>
+    <p:spTree>
+      <p:nvGrpSpPr>
+        <p:cNvPr id="1" name=""/>
+        <p:cNvGrpSpPr/>
+        <p:nvPr/>
+      </p:nvGrpSpPr>
+      <p:grpSpPr>
+        <a:xfrm>
+          <a:off x="0" y="0"/>
+          <a:ext cx="0" cy="0"/>
+          <a:chOff x="0" y="0"/>
+          <a:chExt cx="0" cy="0"/>
+        </a:xfrm>
+      </p:grpSpPr>
+      <p:sp>
+        <p:nvSpPr>
+          <p:cNvPr id="2" name="Slide Image Placeholder 1"/>
+          <p:cNvSpPr>
+            <a:spLocks noGrp="1" noRot="1" noChangeAspect="1"/>
+          </p:cNvSpPr>
+          <p:nvPr>
+            <p:ph type="sldImg"/>
+          </p:nvPr>
+        </p:nvSpPr>
+        <p:spPr/>
+      </p:sp>
+      <p:sp>
+        <p:nvSpPr>
+          <p:cNvPr id="3" name="Notes Placeholder 2"/>
+          <p:cNvSpPr>
+            <a:spLocks noGrp="1"/>
+          </p:cNvSpPr>
+          <p:nvPr>
+            <p:ph type="body" idx="1"/>
+          </p:nvPr>
+        </p:nvSpPr>
+        <p:spPr/>
+        <p:txBody>
+          <a:bodyPr/>
+          <a:lstStyle/>
+          <a:p>
+            <a:r>
+              <a:rPr lang="en-SG" dirty="0" smtClean="0"/>
+              <a:t>Gerald</a:t>
+            </a:r>
+            <a:endParaRPr lang="en-SG" dirty="0"/>
+          </a:p>
+        </p:txBody>
+      </p:sp>
+      <p:sp>
+        <p:nvSpPr>
+          <p:cNvPr id="4" name="Slide Number Placeholder 3"/>
+          <p:cNvSpPr>
+            <a:spLocks noGrp="1"/>
+          </p:cNvSpPr>
+          <p:nvPr>
+            <p:ph type="sldNum" sz="quarter" idx="10"/>
+          </p:nvPr>
+        </p:nvSpPr>
+        <p:spPr/>
+        <p:txBody>
+          <a:bodyPr/>
+          <a:lstStyle/>
+          <a:p>
+            <a:fld id="{4F4A94F8-4A4A-481D-8A42-FFF271D88B52}" type="slidenum">
+              <a:rPr lang="en-SG" smtClean="0"/>
+              <a:t>6</a:t>
+            </a:fld>
+            <a:endParaRPr lang="en-SG"/>
+          </a:p>
+        </p:txBody>
+      </p:sp>
+    </p:spTree>
+    <p:extLst>
+      <p:ext uri="{BB962C8B-B14F-4D97-AF65-F5344CB8AC3E}">
+        <p14:creationId xmlns:p14="http://schemas.microsoft.com/office/powerpoint/2010/main" val="140443821"/>
+      </p:ext>
+    </p:extLst>
+  </p:cSld>
+  <p:clrMapOvr>
+    <a:masterClrMapping/>
+  </p:clrMapOvr>
+</p:notes>
+</file>
+
+<file path=ppt/notesSlides/notesSlide5.xml><?xml version="1.0" encoding="utf-8"?>
+<p:notes xmlns:a="http://schemas.openxmlformats.org/drawingml/2006/main" xmlns:r="http://schemas.openxmlformats.org/officeDocument/2006/relationships" xmlns:p="http://schemas.openxmlformats.org/presentationml/2006/main">
+  <p:cSld>
+    <p:spTree>
+      <p:nvGrpSpPr>
+        <p:cNvPr id="1" name=""/>
+        <p:cNvGrpSpPr/>
+        <p:nvPr/>
+      </p:nvGrpSpPr>
+      <p:grpSpPr>
+        <a:xfrm>
+          <a:off x="0" y="0"/>
+          <a:ext cx="0" cy="0"/>
+          <a:chOff x="0" y="0"/>
+          <a:chExt cx="0" cy="0"/>
+        </a:xfrm>
+      </p:grpSpPr>
+      <p:sp>
+        <p:nvSpPr>
+          <p:cNvPr id="2" name="Slide Image Placeholder 1"/>
+          <p:cNvSpPr>
+            <a:spLocks noGrp="1" noRot="1" noChangeAspect="1"/>
+          </p:cNvSpPr>
+          <p:nvPr>
+            <p:ph type="sldImg"/>
+          </p:nvPr>
+        </p:nvSpPr>
+        <p:spPr/>
+      </p:sp>
+      <p:sp>
+        <p:nvSpPr>
+          <p:cNvPr id="3" name="Notes Placeholder 2"/>
+          <p:cNvSpPr>
+            <a:spLocks noGrp="1"/>
+          </p:cNvSpPr>
+          <p:nvPr>
+            <p:ph type="body" idx="1"/>
+          </p:nvPr>
+        </p:nvSpPr>
+        <p:spPr/>
+        <p:txBody>
+          <a:bodyPr/>
+          <a:lstStyle/>
+          <a:p>
+            <a:r>
+              <a:rPr lang="en-SG" dirty="0" smtClean="0"/>
+              <a:t>Edmund</a:t>
+            </a:r>
+            <a:endParaRPr lang="en-SG" dirty="0"/>
+          </a:p>
+        </p:txBody>
+      </p:sp>
+      <p:sp>
+        <p:nvSpPr>
+          <p:cNvPr id="4" name="Slide Number Placeholder 3"/>
+          <p:cNvSpPr>
+            <a:spLocks noGrp="1"/>
+          </p:cNvSpPr>
+          <p:nvPr>
+            <p:ph type="sldNum" sz="quarter" idx="10"/>
+          </p:nvPr>
+        </p:nvSpPr>
+        <p:spPr/>
+        <p:txBody>
+          <a:bodyPr/>
+          <a:lstStyle/>
+          <a:p>
+            <a:fld id="{4F4A94F8-4A4A-481D-8A42-FFF271D88B52}" type="slidenum">
+              <a:rPr lang="en-SG" smtClean="0"/>
+              <a:t>7</a:t>
+            </a:fld>
+            <a:endParaRPr lang="en-SG"/>
+          </a:p>
+        </p:txBody>
+      </p:sp>
+    </p:spTree>
+    <p:extLst>
+      <p:ext uri="{BB962C8B-B14F-4D97-AF65-F5344CB8AC3E}">
+        <p14:creationId xmlns:p14="http://schemas.microsoft.com/office/powerpoint/2010/main" val="338390614"/>
+      </p:ext>
+    </p:extLst>
+  </p:cSld>
+  <p:clrMapOvr>
+    <a:masterClrMapping/>
+  </p:clrMapOvr>
+</p:notes>
+</file>
+
+<file path=ppt/notesSlides/notesSlide6.xml><?xml version="1.0" encoding="utf-8"?>
+<p:notes xmlns:a="http://schemas.openxmlformats.org/drawingml/2006/main" xmlns:r="http://schemas.openxmlformats.org/officeDocument/2006/relationships" xmlns:p="http://schemas.openxmlformats.org/presentationml/2006/main">
+  <p:cSld>
+    <p:spTree>
+      <p:nvGrpSpPr>
+        <p:cNvPr id="1" name=""/>
+        <p:cNvGrpSpPr/>
+        <p:nvPr/>
+      </p:nvGrpSpPr>
+      <p:grpSpPr>
+        <a:xfrm>
+          <a:off x="0" y="0"/>
+          <a:ext cx="0" cy="0"/>
+          <a:chOff x="0" y="0"/>
+          <a:chExt cx="0" cy="0"/>
+        </a:xfrm>
+      </p:grpSpPr>
+      <p:sp>
+        <p:nvSpPr>
+          <p:cNvPr id="2" name="Slide Image Placeholder 1"/>
+          <p:cNvSpPr>
+            <a:spLocks noGrp="1" noRot="1" noChangeAspect="1"/>
+          </p:cNvSpPr>
+          <p:nvPr>
+            <p:ph type="sldImg"/>
+          </p:nvPr>
+        </p:nvSpPr>
+        <p:spPr/>
+      </p:sp>
+      <p:sp>
+        <p:nvSpPr>
+          <p:cNvPr id="3" name="Notes Placeholder 2"/>
+          <p:cNvSpPr>
+            <a:spLocks noGrp="1"/>
+          </p:cNvSpPr>
+          <p:nvPr>
+            <p:ph type="body" idx="1"/>
+          </p:nvPr>
+        </p:nvSpPr>
+        <p:spPr/>
+        <p:txBody>
+          <a:bodyPr/>
+          <a:lstStyle/>
+          <a:p>
+            <a:r>
+              <a:rPr lang="en-SG" dirty="0" smtClean="0"/>
+              <a:t>Edmund</a:t>
+            </a:r>
+            <a:endParaRPr lang="en-SG" dirty="0"/>
+          </a:p>
+        </p:txBody>
+      </p:sp>
+      <p:sp>
+        <p:nvSpPr>
+          <p:cNvPr id="4" name="Slide Number Placeholder 3"/>
+          <p:cNvSpPr>
+            <a:spLocks noGrp="1"/>
+          </p:cNvSpPr>
+          <p:nvPr>
+            <p:ph type="sldNum" sz="quarter" idx="10"/>
+          </p:nvPr>
+        </p:nvSpPr>
+        <p:spPr/>
+        <p:txBody>
+          <a:bodyPr/>
+          <a:lstStyle/>
+          <a:p>
+            <a:fld id="{4F4A94F8-4A4A-481D-8A42-FFF271D88B52}" type="slidenum">
+              <a:rPr lang="en-SG" smtClean="0"/>
+              <a:t>8</a:t>
+            </a:fld>
+            <a:endParaRPr lang="en-SG"/>
+          </a:p>
+        </p:txBody>
+      </p:sp>
+    </p:spTree>
+    <p:extLst>
+      <p:ext uri="{BB962C8B-B14F-4D97-AF65-F5344CB8AC3E}">
+        <p14:creationId xmlns:p14="http://schemas.microsoft.com/office/powerpoint/2010/main" val="2153856426"/>
+      </p:ext>
+    </p:extLst>
+  </p:cSld>
+  <p:clrMapOvr>
+    <a:masterClrMapping/>
+  </p:clrMapOvr>
+</p:notes>
+</file>
+
+<file path=ppt/notesSlides/notesSlide7.xml><?xml version="1.0" encoding="utf-8"?>
+<p:notes xmlns:a="http://schemas.openxmlformats.org/drawingml/2006/main" xmlns:r="http://schemas.openxmlformats.org/officeDocument/2006/relationships" xmlns:p="http://schemas.openxmlformats.org/presentationml/2006/main">
+  <p:cSld>
+    <p:spTree>
+      <p:nvGrpSpPr>
+        <p:cNvPr id="1" name=""/>
+        <p:cNvGrpSpPr/>
+        <p:nvPr/>
+      </p:nvGrpSpPr>
+      <p:grpSpPr>
+        <a:xfrm>
+          <a:off x="0" y="0"/>
+          <a:ext cx="0" cy="0"/>
+          <a:chOff x="0" y="0"/>
+          <a:chExt cx="0" cy="0"/>
+        </a:xfrm>
+      </p:grpSpPr>
+      <p:sp>
+        <p:nvSpPr>
+          <p:cNvPr id="2" name="Slide Image Placeholder 1"/>
+          <p:cNvSpPr>
+            <a:spLocks noGrp="1" noRot="1" noChangeAspect="1"/>
+          </p:cNvSpPr>
+          <p:nvPr>
+            <p:ph type="sldImg"/>
+          </p:nvPr>
+        </p:nvSpPr>
+        <p:spPr/>
+      </p:sp>
+      <p:sp>
+        <p:nvSpPr>
+          <p:cNvPr id="3" name="Notes Placeholder 2"/>
+          <p:cNvSpPr>
+            <a:spLocks noGrp="1"/>
+          </p:cNvSpPr>
+          <p:nvPr>
+            <p:ph type="body" idx="1"/>
+          </p:nvPr>
+        </p:nvSpPr>
+        <p:spPr/>
+        <p:txBody>
+          <a:bodyPr/>
+          <a:lstStyle/>
+          <a:p>
+            <a:r>
+              <a:rPr lang="en-SG" dirty="0" smtClean="0"/>
+              <a:t>Edmund</a:t>
+            </a:r>
+            <a:endParaRPr lang="en-SG" dirty="0"/>
+          </a:p>
+        </p:txBody>
+      </p:sp>
+      <p:sp>
+        <p:nvSpPr>
+          <p:cNvPr id="4" name="Slide Number Placeholder 3"/>
+          <p:cNvSpPr>
+            <a:spLocks noGrp="1"/>
+          </p:cNvSpPr>
+          <p:nvPr>
+            <p:ph type="sldNum" sz="quarter" idx="10"/>
+          </p:nvPr>
+        </p:nvSpPr>
+        <p:spPr/>
+        <p:txBody>
+          <a:bodyPr/>
+          <a:lstStyle/>
+          <a:p>
+            <a:fld id="{4F4A94F8-4A4A-481D-8A42-FFF271D88B52}" type="slidenum">
+              <a:rPr lang="en-SG" smtClean="0"/>
+              <a:t>9</a:t>
+            </a:fld>
+            <a:endParaRPr lang="en-SG"/>
+          </a:p>
+        </p:txBody>
+      </p:sp>
+    </p:spTree>
+    <p:extLst>
+      <p:ext uri="{BB962C8B-B14F-4D97-AF65-F5344CB8AC3E}">
+        <p14:creationId xmlns:p14="http://schemas.microsoft.com/office/powerpoint/2010/main" val="1003961873"/>
+      </p:ext>
+    </p:extLst>
+  </p:cSld>
+  <p:clrMapOvr>
+    <a:masterClrMapping/>
+  </p:clrMapOvr>
+</p:notes>
+</file>
+
+<file path=ppt/notesSlides/notesSlide8.xml><?xml version="1.0" encoding="utf-8"?>
+<p:notes xmlns:a="http://schemas.openxmlformats.org/drawingml/2006/main" xmlns:r="http://schemas.openxmlformats.org/officeDocument/2006/relationships" xmlns:p="http://schemas.openxmlformats.org/presentationml/2006/main">
+  <p:cSld>
+    <p:spTree>
+      <p:nvGrpSpPr>
+        <p:cNvPr id="1" name=""/>
+        <p:cNvGrpSpPr/>
+        <p:nvPr/>
+      </p:nvGrpSpPr>
+      <p:grpSpPr>
+        <a:xfrm>
+          <a:off x="0" y="0"/>
+          <a:ext cx="0" cy="0"/>
+          <a:chOff x="0" y="0"/>
+          <a:chExt cx="0" cy="0"/>
+        </a:xfrm>
+      </p:grpSpPr>
+      <p:sp>
+        <p:nvSpPr>
+          <p:cNvPr id="2" name="Slide Image Placeholder 1"/>
+          <p:cNvSpPr>
+            <a:spLocks noGrp="1" noRot="1" noChangeAspect="1"/>
+          </p:cNvSpPr>
+          <p:nvPr>
+            <p:ph type="sldImg"/>
+          </p:nvPr>
+        </p:nvSpPr>
+        <p:spPr/>
+      </p:sp>
+      <p:sp>
+        <p:nvSpPr>
+          <p:cNvPr id="3" name="Notes Placeholder 2"/>
+          <p:cNvSpPr>
+            <a:spLocks noGrp="1"/>
+          </p:cNvSpPr>
+          <p:nvPr>
+            <p:ph type="body" idx="1"/>
+          </p:nvPr>
+        </p:nvSpPr>
+        <p:spPr/>
+        <p:txBody>
+          <a:bodyPr/>
+          <a:lstStyle/>
+          <a:p>
+            <a:r>
+              <a:rPr lang="en-SG" dirty="0" smtClean="0"/>
+              <a:t>Glenn</a:t>
+            </a:r>
+            <a:endParaRPr lang="en-SG" dirty="0"/>
+          </a:p>
+        </p:txBody>
+      </p:sp>
+      <p:sp>
+        <p:nvSpPr>
+          <p:cNvPr id="4" name="Slide Number Placeholder 3"/>
+          <p:cNvSpPr>
+            <a:spLocks noGrp="1"/>
+          </p:cNvSpPr>
+          <p:nvPr>
+            <p:ph type="sldNum" sz="quarter" idx="10"/>
+          </p:nvPr>
+        </p:nvSpPr>
+        <p:spPr/>
+        <p:txBody>
+          <a:bodyPr/>
+          <a:lstStyle/>
+          <a:p>
+            <a:fld id="{4F4A94F8-4A4A-481D-8A42-FFF271D88B52}" type="slidenum">
+              <a:rPr lang="en-SG" smtClean="0"/>
+              <a:t>10</a:t>
+            </a:fld>
+            <a:endParaRPr lang="en-SG"/>
+          </a:p>
+        </p:txBody>
+      </p:sp>
+    </p:spTree>
+    <p:extLst>
+      <p:ext uri="{BB962C8B-B14F-4D97-AF65-F5344CB8AC3E}">
+        <p14:creationId xmlns:p14="http://schemas.microsoft.com/office/powerpoint/2010/main" val="2244145615"/>
+      </p:ext>
+    </p:extLst>
+  </p:cSld>
+  <p:clrMapOvr>
+    <a:masterClrMapping/>
+  </p:clrMapOvr>
+</p:notes>
+</file>
+
+<file path=ppt/notesSlides/notesSlide9.xml><?xml version="1.0" encoding="utf-8"?>
+<p:notes xmlns:a="http://schemas.openxmlformats.org/drawingml/2006/main" xmlns:r="http://schemas.openxmlformats.org/officeDocument/2006/relationships" xmlns:p="http://schemas.openxmlformats.org/presentationml/2006/main">
+  <p:cSld>
+    <p:spTree>
+      <p:nvGrpSpPr>
+        <p:cNvPr id="1" name=""/>
+        <p:cNvGrpSpPr/>
+        <p:nvPr/>
+      </p:nvGrpSpPr>
+      <p:grpSpPr>
+        <a:xfrm>
+          <a:off x="0" y="0"/>
+          <a:ext cx="0" cy="0"/>
+          <a:chOff x="0" y="0"/>
+          <a:chExt cx="0" cy="0"/>
+        </a:xfrm>
+      </p:grpSpPr>
+      <p:sp>
+        <p:nvSpPr>
+          <p:cNvPr id="2" name="Slide Image Placeholder 1"/>
+          <p:cNvSpPr>
+            <a:spLocks noGrp="1" noRot="1" noChangeAspect="1"/>
+          </p:cNvSpPr>
+          <p:nvPr>
+            <p:ph type="sldImg"/>
+          </p:nvPr>
+        </p:nvSpPr>
+        <p:spPr/>
+      </p:sp>
+      <p:sp>
+        <p:nvSpPr>
+          <p:cNvPr id="3" name="Notes Placeholder 2"/>
+          <p:cNvSpPr>
+            <a:spLocks noGrp="1"/>
+          </p:cNvSpPr>
+          <p:nvPr>
+            <p:ph type="body" idx="1"/>
+          </p:nvPr>
+        </p:nvSpPr>
+        <p:spPr/>
+        <p:txBody>
+          <a:bodyPr/>
+          <a:lstStyle/>
+          <a:p>
+            <a:r>
+              <a:rPr lang="en-SG" dirty="0" smtClean="0"/>
+              <a:t>Gerald</a:t>
+            </a:r>
+            <a:endParaRPr lang="en-SG" dirty="0"/>
+          </a:p>
+        </p:txBody>
+      </p:sp>
+      <p:sp>
+        <p:nvSpPr>
+          <p:cNvPr id="4" name="Slide Number Placeholder 3"/>
+          <p:cNvSpPr>
+            <a:spLocks noGrp="1"/>
+          </p:cNvSpPr>
+          <p:nvPr>
+            <p:ph type="sldNum" sz="quarter" idx="10"/>
+          </p:nvPr>
+        </p:nvSpPr>
+        <p:spPr/>
+        <p:txBody>
+          <a:bodyPr/>
+          <a:lstStyle/>
+          <a:p>
+            <a:fld id="{4F4A94F8-4A4A-481D-8A42-FFF271D88B52}" type="slidenum">
+              <a:rPr lang="en-SG" smtClean="0"/>
+              <a:t>11</a:t>
+            </a:fld>
+            <a:endParaRPr lang="en-SG"/>
+          </a:p>
+        </p:txBody>
+      </p:sp>
+    </p:spTree>
+    <p:extLst>
+      <p:ext uri="{BB962C8B-B14F-4D97-AF65-F5344CB8AC3E}">
+        <p14:creationId xmlns:p14="http://schemas.microsoft.com/office/powerpoint/2010/main" val="1869189609"/>
+      </p:ext>
+    </p:extLst>
+  </p:cSld>
+  <p:clrMapOvr>
+    <a:masterClrMapping/>
+  </p:clrMapOvr>
+</p:notes>
+</file>
+
 <file path=ppt/slideLayouts/slideLayout1.xml><?xml version="1.0" encoding="utf-8"?>
 <p:sldLayout xmlns:a="http://schemas.openxmlformats.org/drawingml/2006/main" xmlns:r="http://schemas.openxmlformats.org/officeDocument/2006/relationships" xmlns:p="http://schemas.openxmlformats.org/presentationml/2006/main" type="title" preserve="1">
   <p:cSld name="Title Slide">
@@ -321,7 +1818,7 @@
           <a:p>
             <a:fld id="{4AAD347D-5ACD-4C99-B74B-A9C85AD731AF}" type="datetimeFigureOut">
               <a:rPr lang="en-US" dirty="0"/>
-              <a:t>02/09/2015</a:t>
+              <a:t>9/2/2015</a:t>
             </a:fld>
             <a:endParaRPr lang="en-US" dirty="0"/>
           </a:p>
@@ -591,7 +2088,7 @@
           <a:p>
             <a:fld id="{4509A250-FF31-4206-8172-F9D3106AACB1}" type="datetimeFigureOut">
               <a:rPr lang="en-US" dirty="0"/>
-              <a:t>02/09/2015</a:t>
+              <a:t>9/2/2015</a:t>
             </a:fld>
             <a:endParaRPr lang="en-US" dirty="0"/>
           </a:p>
@@ -780,7 +2277,7 @@
           <a:p>
             <a:fld id="{4509A250-FF31-4206-8172-F9D3106AACB1}" type="datetimeFigureOut">
               <a:rPr lang="en-US" dirty="0"/>
-              <a:t>02/09/2015</a:t>
+              <a:t>9/2/2015</a:t>
             </a:fld>
             <a:endParaRPr lang="en-US" dirty="0"/>
           </a:p>
@@ -1043,7 +2540,7 @@
           <a:p>
             <a:fld id="{4509A250-FF31-4206-8172-F9D3106AACB1}" type="datetimeFigureOut">
               <a:rPr lang="en-US" dirty="0"/>
-              <a:t>02/09/2015</a:t>
+              <a:t>9/2/2015</a:t>
             </a:fld>
             <a:endParaRPr lang="en-US" dirty="0"/>
           </a:p>
@@ -1370,7 +2867,7 @@
           <a:p>
             <a:fld id="{4509A250-FF31-4206-8172-F9D3106AACB1}" type="datetimeFigureOut">
               <a:rPr lang="en-US" dirty="0"/>
-              <a:t>02/09/2015</a:t>
+              <a:t>9/2/2015</a:t>
             </a:fld>
             <a:endParaRPr lang="en-US" dirty="0"/>
           </a:p>
@@ -1975,7 +3472,7 @@
           <a:p>
             <a:fld id="{4509A250-FF31-4206-8172-F9D3106AACB1}" type="datetimeFigureOut">
               <a:rPr lang="en-US" dirty="0"/>
-              <a:t>02/09/2015</a:t>
+              <a:t>9/2/2015</a:t>
             </a:fld>
             <a:endParaRPr lang="en-US" dirty="0"/>
           </a:p>
@@ -2817,7 +4314,7 @@
           <a:p>
             <a:fld id="{4509A250-FF31-4206-8172-F9D3106AACB1}" type="datetimeFigureOut">
               <a:rPr lang="en-US" dirty="0"/>
-              <a:t>02/09/2015</a:t>
+              <a:t>9/2/2015</a:t>
             </a:fld>
             <a:endParaRPr lang="en-US" dirty="0"/>
           </a:p>
@@ -2982,7 +4479,7 @@
           <a:p>
             <a:fld id="{4509A250-FF31-4206-8172-F9D3106AACB1}" type="datetimeFigureOut">
               <a:rPr lang="en-US" dirty="0"/>
-              <a:t>02/09/2015</a:t>
+              <a:t>9/2/2015</a:t>
             </a:fld>
             <a:endParaRPr lang="en-US" dirty="0"/>
           </a:p>
@@ -3157,7 +4654,7 @@
           <a:p>
             <a:fld id="{4509A250-FF31-4206-8172-F9D3106AACB1}" type="datetimeFigureOut">
               <a:rPr lang="en-US" dirty="0"/>
-              <a:t>02/09/2015</a:t>
+              <a:t>9/2/2015</a:t>
             </a:fld>
             <a:endParaRPr lang="en-US" dirty="0"/>
           </a:p>
@@ -3322,7 +4819,7 @@
           <a:p>
             <a:fld id="{4509A250-FF31-4206-8172-F9D3106AACB1}" type="datetimeFigureOut">
               <a:rPr lang="en-US" dirty="0"/>
-              <a:t>02/09/2015</a:t>
+              <a:t>9/2/2015</a:t>
             </a:fld>
             <a:endParaRPr lang="en-US" dirty="0"/>
           </a:p>
@@ -3561,7 +5058,7 @@
           <a:p>
             <a:fld id="{4509A250-FF31-4206-8172-F9D3106AACB1}" type="datetimeFigureOut">
               <a:rPr lang="en-US" dirty="0"/>
-              <a:t>02/09/2015</a:t>
+              <a:t>9/2/2015</a:t>
             </a:fld>
             <a:endParaRPr lang="en-US" dirty="0"/>
           </a:p>
@@ -3848,7 +5345,7 @@
           <a:p>
             <a:fld id="{4509A250-FF31-4206-8172-F9D3106AACB1}" type="datetimeFigureOut">
               <a:rPr lang="en-US" dirty="0"/>
-              <a:t>02/09/2015</a:t>
+              <a:t>9/2/2015</a:t>
             </a:fld>
             <a:endParaRPr lang="en-US" dirty="0"/>
           </a:p>
@@ -4281,7 +5778,7 @@
           <a:p>
             <a:fld id="{4509A250-FF31-4206-8172-F9D3106AACB1}" type="datetimeFigureOut">
               <a:rPr lang="en-US" dirty="0"/>
-              <a:t>02/09/2015</a:t>
+              <a:t>9/2/2015</a:t>
             </a:fld>
             <a:endParaRPr lang="en-US" dirty="0"/>
           </a:p>
@@ -4394,7 +5891,7 @@
           <a:p>
             <a:fld id="{4509A250-FF31-4206-8172-F9D3106AACB1}" type="datetimeFigureOut">
               <a:rPr lang="en-US" dirty="0"/>
-              <a:t>02/09/2015</a:t>
+              <a:t>9/2/2015</a:t>
             </a:fld>
             <a:endParaRPr lang="en-US" dirty="0"/>
           </a:p>
@@ -4484,7 +5981,7 @@
           <a:p>
             <a:fld id="{4509A250-FF31-4206-8172-F9D3106AACB1}" type="datetimeFigureOut">
               <a:rPr lang="en-US" dirty="0"/>
-              <a:t>02/09/2015</a:t>
+              <a:t>9/2/2015</a:t>
             </a:fld>
             <a:endParaRPr lang="en-US" dirty="0"/>
           </a:p>
@@ -4758,7 +6255,7 @@
           <a:p>
             <a:fld id="{4509A250-FF31-4206-8172-F9D3106AACB1}" type="datetimeFigureOut">
               <a:rPr lang="en-US" dirty="0"/>
-              <a:t>02/09/2015</a:t>
+              <a:t>9/2/2015</a:t>
             </a:fld>
             <a:endParaRPr lang="en-US" dirty="0"/>
           </a:p>
@@ -5028,7 +6525,7 @@
           <a:p>
             <a:fld id="{4509A250-FF31-4206-8172-F9D3106AACB1}" type="datetimeFigureOut">
               <a:rPr lang="en-US" dirty="0"/>
-              <a:t>02/09/2015</a:t>
+              <a:t>9/2/2015</a:t>
             </a:fld>
             <a:endParaRPr lang="en-US" dirty="0"/>
           </a:p>
@@ -5452,7 +6949,7 @@
           <a:p>
             <a:fld id="{4509A250-FF31-4206-8172-F9D3106AACB1}" type="datetimeFigureOut">
               <a:rPr lang="en-US" dirty="0"/>
-              <a:t>02/09/2015</a:t>
+              <a:t>9/2/2015</a:t>
             </a:fld>
             <a:endParaRPr lang="en-US" dirty="0"/>
           </a:p>
@@ -6803,7 +8300,7 @@
           <p:nvPr/>
         </p:nvPicPr>
         <p:blipFill>
-          <a:blip r:embed="rId2">
+          <a:blip r:embed="rId3">
             <a:extLst>
               <a:ext uri="{28A0092B-C50C-407E-A947-70E740481C1C}">
                 <a14:useLocalDpi xmlns:a14="http://schemas.microsoft.com/office/drawing/2010/main" val="0"/>
@@ -6844,7 +8341,7 @@
           <p:nvPr/>
         </p:nvPicPr>
         <p:blipFill>
-          <a:blip r:embed="rId3">
+          <a:blip r:embed="rId4">
             <a:extLst>
               <a:ext uri="{28A0092B-C50C-407E-A947-70E740481C1C}">
                 <a14:useLocalDpi xmlns:a14="http://schemas.microsoft.com/office/drawing/2010/main" val="0"/>
@@ -8284,4 +9781,265 @@
     </a:ext>
   </a:extLst>
 </a:theme>
+</file>
+
+<file path=ppt/theme/theme2.xml><?xml version="1.0" encoding="utf-8"?>
+<a:theme xmlns:a="http://schemas.openxmlformats.org/drawingml/2006/main" name="Office Theme">
+  <a:themeElements>
+    <a:clrScheme name="Office">
+      <a:dk1>
+        <a:sysClr val="windowText" lastClr="000000"/>
+      </a:dk1>
+      <a:lt1>
+        <a:sysClr val="window" lastClr="FFFFFF"/>
+      </a:lt1>
+      <a:dk2>
+        <a:srgbClr val="44546A"/>
+      </a:dk2>
+      <a:lt2>
+        <a:srgbClr val="E7E6E6"/>
+      </a:lt2>
+      <a:accent1>
+        <a:srgbClr val="5B9BD5"/>
+      </a:accent1>
+      <a:accent2>
+        <a:srgbClr val="ED7D31"/>
+      </a:accent2>
+      <a:accent3>
+        <a:srgbClr val="A5A5A5"/>
+      </a:accent3>
+      <a:accent4>
+        <a:srgbClr val="FFC000"/>
+      </a:accent4>
+      <a:accent5>
+        <a:srgbClr val="4472C4"/>
+      </a:accent5>
+      <a:accent6>
+        <a:srgbClr val="70AD47"/>
+      </a:accent6>
+      <a:hlink>
+        <a:srgbClr val="0563C1"/>
+      </a:hlink>
+      <a:folHlink>
+        <a:srgbClr val="954F72"/>
+      </a:folHlink>
+    </a:clrScheme>
+    <a:fontScheme name="Office">
+      <a:majorFont>
+        <a:latin typeface="Calibri Light" panose="020F0302020204030204"/>
+        <a:ea typeface=""/>
+        <a:cs typeface=""/>
+        <a:font script="Jpan" typeface="ＭＳ Ｐゴシック"/>
+        <a:font script="Hang" typeface="맑은 고딕"/>
+        <a:font script="Hans" typeface="宋体"/>
+        <a:font script="Hant" typeface="新細明體"/>
+        <a:font script="Arab" typeface="Times New Roman"/>
+        <a:font script="Hebr" typeface="Times New Roman"/>
+        <a:font script="Thai" typeface="Angsana New"/>
+        <a:font script="Ethi" typeface="Nyala"/>
+        <a:font script="Beng" typeface="Vrinda"/>
+        <a:font script="Gujr" typeface="Shruti"/>
+        <a:font script="Khmr" typeface="MoolBoran"/>
+        <a:font script="Knda" typeface="Tunga"/>
+        <a:font script="Guru" typeface="Raavi"/>
+        <a:font script="Cans" typeface="Euphemia"/>
+        <a:font script="Cher" typeface="Plantagenet Cherokee"/>
+        <a:font script="Yiii" typeface="Microsoft Yi Baiti"/>
+        <a:font script="Tibt" typeface="Microsoft Himalaya"/>
+        <a:font script="Thaa" typeface="MV Boli"/>
+        <a:font script="Deva" typeface="Mangal"/>
+        <a:font script="Telu" typeface="Gautami"/>
+        <a:font script="Taml" typeface="Latha"/>
+        <a:font script="Syrc" typeface="Estrangelo Edessa"/>
+        <a:font script="Orya" typeface="Kalinga"/>
+        <a:font script="Mlym" typeface="Kartika"/>
+        <a:font script="Laoo" typeface="DokChampa"/>
+        <a:font script="Sinh" typeface="Iskoola Pota"/>
+        <a:font script="Mong" typeface="Mongolian Baiti"/>
+        <a:font script="Viet" typeface="Times New Roman"/>
+        <a:font script="Uigh" typeface="Microsoft Uighur"/>
+        <a:font script="Geor" typeface="Sylfaen"/>
+      </a:majorFont>
+      <a:minorFont>
+        <a:latin typeface="Calibri" panose="020F0502020204030204"/>
+        <a:ea typeface=""/>
+        <a:cs typeface=""/>
+        <a:font script="Jpan" typeface="ＭＳ Ｐゴシック"/>
+        <a:font script="Hang" typeface="맑은 고딕"/>
+        <a:font script="Hans" typeface="宋体"/>
+        <a:font script="Hant" typeface="新細明體"/>
+        <a:font script="Arab" typeface="Arial"/>
+        <a:font script="Hebr" typeface="Arial"/>
+        <a:font script="Thai" typeface="Cordia New"/>
+        <a:font script="Ethi" typeface="Nyala"/>
+        <a:font script="Beng" typeface="Vrinda"/>
+        <a:font script="Gujr" typeface="Shruti"/>
+        <a:font script="Khmr" typeface="DaunPenh"/>
+        <a:font script="Knda" typeface="Tunga"/>
+        <a:font script="Guru" typeface="Raavi"/>
+        <a:font script="Cans" typeface="Euphemia"/>
+        <a:font script="Cher" typeface="Plantagenet Cherokee"/>
+        <a:font script="Yiii" typeface="Microsoft Yi Baiti"/>
+        <a:font script="Tibt" typeface="Microsoft Himalaya"/>
+        <a:font script="Thaa" typeface="MV Boli"/>
+        <a:font script="Deva" typeface="Mangal"/>
+        <a:font script="Telu" typeface="Gautami"/>
+        <a:font script="Taml" typeface="Latha"/>
+        <a:font script="Syrc" typeface="Estrangelo Edessa"/>
+        <a:font script="Orya" typeface="Kalinga"/>
+        <a:font script="Mlym" typeface="Kartika"/>
+        <a:font script="Laoo" typeface="DokChampa"/>
+        <a:font script="Sinh" typeface="Iskoola Pota"/>
+        <a:font script="Mong" typeface="Mongolian Baiti"/>
+        <a:font script="Viet" typeface="Arial"/>
+        <a:font script="Uigh" typeface="Microsoft Uighur"/>
+        <a:font script="Geor" typeface="Sylfaen"/>
+      </a:minorFont>
+    </a:fontScheme>
+    <a:fmtScheme name="Office">
+      <a:fillStyleLst>
+        <a:solidFill>
+          <a:schemeClr val="phClr"/>
+        </a:solidFill>
+        <a:gradFill rotWithShape="1">
+          <a:gsLst>
+            <a:gs pos="0">
+              <a:schemeClr val="phClr">
+                <a:lumMod val="110000"/>
+                <a:satMod val="105000"/>
+                <a:tint val="67000"/>
+              </a:schemeClr>
+            </a:gs>
+            <a:gs pos="50000">
+              <a:schemeClr val="phClr">
+                <a:lumMod val="105000"/>
+                <a:satMod val="103000"/>
+                <a:tint val="73000"/>
+              </a:schemeClr>
+            </a:gs>
+            <a:gs pos="100000">
+              <a:schemeClr val="phClr">
+                <a:lumMod val="105000"/>
+                <a:satMod val="109000"/>
+                <a:tint val="81000"/>
+              </a:schemeClr>
+            </a:gs>
+          </a:gsLst>
+          <a:lin ang="5400000" scaled="0"/>
+        </a:gradFill>
+        <a:gradFill rotWithShape="1">
+          <a:gsLst>
+            <a:gs pos="0">
+              <a:schemeClr val="phClr">
+                <a:satMod val="103000"/>
+                <a:lumMod val="102000"/>
+                <a:tint val="94000"/>
+              </a:schemeClr>
+            </a:gs>
+            <a:gs pos="50000">
+              <a:schemeClr val="phClr">
+                <a:satMod val="110000"/>
+                <a:lumMod val="100000"/>
+                <a:shade val="100000"/>
+              </a:schemeClr>
+            </a:gs>
+            <a:gs pos="100000">
+              <a:schemeClr val="phClr">
+                <a:lumMod val="99000"/>
+                <a:satMod val="120000"/>
+                <a:shade val="78000"/>
+              </a:schemeClr>
+            </a:gs>
+          </a:gsLst>
+          <a:lin ang="5400000" scaled="0"/>
+        </a:gradFill>
+      </a:fillStyleLst>
+      <a:lnStyleLst>
+        <a:ln w="6350" cap="flat" cmpd="sng" algn="ctr">
+          <a:solidFill>
+            <a:schemeClr val="phClr"/>
+          </a:solidFill>
+          <a:prstDash val="solid"/>
+          <a:miter lim="800000"/>
+        </a:ln>
+        <a:ln w="12700" cap="flat" cmpd="sng" algn="ctr">
+          <a:solidFill>
+            <a:schemeClr val="phClr"/>
+          </a:solidFill>
+          <a:prstDash val="solid"/>
+          <a:miter lim="800000"/>
+        </a:ln>
+        <a:ln w="19050" cap="flat" cmpd="sng" algn="ctr">
+          <a:solidFill>
+            <a:schemeClr val="phClr"/>
+          </a:solidFill>
+          <a:prstDash val="solid"/>
+          <a:miter lim="800000"/>
+        </a:ln>
+      </a:lnStyleLst>
+      <a:effectStyleLst>
+        <a:effectStyle>
+          <a:effectLst/>
+        </a:effectStyle>
+        <a:effectStyle>
+          <a:effectLst/>
+        </a:effectStyle>
+        <a:effectStyle>
+          <a:effectLst>
+            <a:outerShdw blurRad="57150" dist="19050" dir="5400000" algn="ctr" rotWithShape="0">
+              <a:srgbClr val="000000">
+                <a:alpha val="63000"/>
+              </a:srgbClr>
+            </a:outerShdw>
+          </a:effectLst>
+        </a:effectStyle>
+      </a:effectStyleLst>
+      <a:bgFillStyleLst>
+        <a:solidFill>
+          <a:schemeClr val="phClr"/>
+        </a:solidFill>
+        <a:solidFill>
+          <a:schemeClr val="phClr">
+            <a:tint val="95000"/>
+            <a:satMod val="170000"/>
+          </a:schemeClr>
+        </a:solidFill>
+        <a:gradFill rotWithShape="1">
+          <a:gsLst>
+            <a:gs pos="0">
+              <a:schemeClr val="phClr">
+                <a:tint val="93000"/>
+                <a:satMod val="150000"/>
+                <a:shade val="98000"/>
+                <a:lumMod val="102000"/>
+              </a:schemeClr>
+            </a:gs>
+            <a:gs pos="50000">
+              <a:schemeClr val="phClr">
+                <a:tint val="98000"/>
+                <a:satMod val="130000"/>
+                <a:shade val="90000"/>
+                <a:lumMod val="103000"/>
+              </a:schemeClr>
+            </a:gs>
+            <a:gs pos="100000">
+              <a:schemeClr val="phClr">
+                <a:shade val="63000"/>
+                <a:satMod val="120000"/>
+              </a:schemeClr>
+            </a:gs>
+          </a:gsLst>
+          <a:lin ang="5400000" scaled="0"/>
+        </a:gradFill>
+      </a:bgFillStyleLst>
+    </a:fmtScheme>
+  </a:themeElements>
+  <a:objectDefaults/>
+  <a:extraClrSchemeLst/>
+  <a:extLst>
+    <a:ext uri="{05A4C25C-085E-4340-85A3-A5531E510DB2}">
+      <thm15:themeFamily xmlns:thm15="http://schemas.microsoft.com/office/thememl/2012/main" name="Office Theme" id="{62F939B6-93AF-4DB8-9C6B-D6C7DFDC589F}" vid="{4A3C46E8-61CC-4603-A589-7422A47A8E4A}"/>
+    </a:ext>
+  </a:extLst>
+</a:theme>
 </file>
</xml_diff>

<commit_message>
Added my contributions to the documents.
</commit_message>
<xml_diff>
--- a/State Penitentiary 3.pptx
+++ b/State Penitentiary 3.pptx
@@ -7567,12 +7567,361 @@
             <p:ph idx="1"/>
           </p:nvPr>
         </p:nvSpPr>
-        <p:spPr/>
-        <p:txBody>
-          <a:bodyPr/>
-          <a:lstStyle/>
-          <a:p>
-            <a:endParaRPr lang="en-SG"/>
+        <p:spPr>
+          <a:xfrm>
+            <a:off x="5348472" y="2205317"/>
+            <a:ext cx="5072899" cy="4195481"/>
+          </a:xfrm>
+        </p:spPr>
+        <p:txBody>
+          <a:bodyPr>
+            <a:normAutofit/>
+          </a:bodyPr>
+          <a:lstStyle/>
+          <a:p>
+            <a:r>
+              <a:rPr lang="en-SG" dirty="0" smtClean="0"/>
+              <a:t>Features</a:t>
+            </a:r>
+          </a:p>
+          <a:p>
+            <a:pPr lvl="1"/>
+            <a:r>
+              <a:rPr lang="en-SG" dirty="0" smtClean="0"/>
+              <a:t>Invisibility</a:t>
+            </a:r>
+          </a:p>
+          <a:p>
+            <a:pPr lvl="1"/>
+            <a:r>
+              <a:rPr lang="en-SG" dirty="0" smtClean="0"/>
+              <a:t>Peeing</a:t>
+            </a:r>
+          </a:p>
+          <a:p>
+            <a:r>
+              <a:rPr lang="en-SG" dirty="0" smtClean="0"/>
+              <a:t>Level Design</a:t>
+            </a:r>
+          </a:p>
+          <a:p>
+            <a:pPr lvl="1"/>
+            <a:r>
+              <a:rPr lang="en-SG" dirty="0" smtClean="0"/>
+              <a:t>Sample Level</a:t>
+            </a:r>
+          </a:p>
+          <a:p>
+            <a:pPr lvl="1"/>
+            <a:r>
+              <a:rPr lang="en-SG" dirty="0" smtClean="0"/>
+              <a:t>Level 1</a:t>
+            </a:r>
+          </a:p>
+        </p:txBody>
+      </p:sp>
+      <p:sp>
+        <p:nvSpPr>
+          <p:cNvPr id="5" name="Content Placeholder 2"/>
+          <p:cNvSpPr txBox="1">
+            <a:spLocks/>
+          </p:cNvSpPr>
+          <p:nvPr/>
+        </p:nvSpPr>
+        <p:spPr>
+          <a:xfrm>
+            <a:off x="1255712" y="2205318"/>
+            <a:ext cx="5072899" cy="4195481"/>
+          </a:xfrm>
+          <a:prstGeom prst="rect">
+            <a:avLst/>
+          </a:prstGeom>
+        </p:spPr>
+        <p:txBody>
+          <a:bodyPr vert="horz" lIns="91440" tIns="45720" rIns="91440" bIns="45720" rtlCol="0">
+            <a:normAutofit fontScale="92500" lnSpcReduction="20000"/>
+          </a:bodyPr>
+          <a:lstStyle>
+            <a:lvl1pPr marL="342900" indent="-342900" algn="l" defTabSz="457200" rtl="0" eaLnBrk="1" latinLnBrk="0" hangingPunct="1">
+              <a:spcBef>
+                <a:spcPts val="1000"/>
+              </a:spcBef>
+              <a:spcAft>
+                <a:spcPts val="0"/>
+              </a:spcAft>
+              <a:buClr>
+                <a:schemeClr val="accent1"/>
+              </a:buClr>
+              <a:buSzPct val="80000"/>
+              <a:buFont typeface="Wingdings 3" charset="2"/>
+              <a:buChar char=""/>
+              <a:defRPr sz="2000" b="0" i="0" kern="1200">
+                <a:solidFill>
+                  <a:schemeClr val="tx1"/>
+                </a:solidFill>
+                <a:latin typeface="+mj-lt"/>
+                <a:ea typeface="+mj-ea"/>
+                <a:cs typeface="+mj-cs"/>
+              </a:defRPr>
+            </a:lvl1pPr>
+            <a:lvl2pPr marL="742950" indent="-285750" algn="l" defTabSz="457200" rtl="0" eaLnBrk="1" latinLnBrk="0" hangingPunct="1">
+              <a:spcBef>
+                <a:spcPts val="1000"/>
+              </a:spcBef>
+              <a:spcAft>
+                <a:spcPts val="0"/>
+              </a:spcAft>
+              <a:buClr>
+                <a:schemeClr val="accent1"/>
+              </a:buClr>
+              <a:buSzPct val="80000"/>
+              <a:buFont typeface="Wingdings 3" charset="2"/>
+              <a:buChar char=""/>
+              <a:defRPr sz="1800" b="0" i="0" kern="1200">
+                <a:solidFill>
+                  <a:schemeClr val="tx1"/>
+                </a:solidFill>
+                <a:latin typeface="+mj-lt"/>
+                <a:ea typeface="+mj-ea"/>
+                <a:cs typeface="+mj-cs"/>
+              </a:defRPr>
+            </a:lvl2pPr>
+            <a:lvl3pPr marL="1143000" indent="-228600" algn="l" defTabSz="457200" rtl="0" eaLnBrk="1" latinLnBrk="0" hangingPunct="1">
+              <a:spcBef>
+                <a:spcPts val="1000"/>
+              </a:spcBef>
+              <a:spcAft>
+                <a:spcPts val="0"/>
+              </a:spcAft>
+              <a:buClr>
+                <a:schemeClr val="accent1"/>
+              </a:buClr>
+              <a:buSzPct val="80000"/>
+              <a:buFont typeface="Wingdings 3" charset="2"/>
+              <a:buChar char=""/>
+              <a:defRPr sz="1600" b="0" i="0" kern="1200">
+                <a:solidFill>
+                  <a:schemeClr val="tx1"/>
+                </a:solidFill>
+                <a:latin typeface="+mj-lt"/>
+                <a:ea typeface="+mj-ea"/>
+                <a:cs typeface="+mj-cs"/>
+              </a:defRPr>
+            </a:lvl3pPr>
+            <a:lvl4pPr marL="1600200" indent="-228600" algn="l" defTabSz="457200" rtl="0" eaLnBrk="1" latinLnBrk="0" hangingPunct="1">
+              <a:spcBef>
+                <a:spcPts val="1000"/>
+              </a:spcBef>
+              <a:spcAft>
+                <a:spcPts val="0"/>
+              </a:spcAft>
+              <a:buClr>
+                <a:schemeClr val="accent1"/>
+              </a:buClr>
+              <a:buSzPct val="80000"/>
+              <a:buFont typeface="Wingdings 3" charset="2"/>
+              <a:buChar char=""/>
+              <a:defRPr sz="1400" b="0" i="0" kern="1200">
+                <a:solidFill>
+                  <a:schemeClr val="tx1"/>
+                </a:solidFill>
+                <a:latin typeface="+mj-lt"/>
+                <a:ea typeface="+mj-ea"/>
+                <a:cs typeface="+mj-cs"/>
+              </a:defRPr>
+            </a:lvl4pPr>
+            <a:lvl5pPr marL="2057400" indent="-228600" algn="l" defTabSz="457200" rtl="0" eaLnBrk="1" latinLnBrk="0" hangingPunct="1">
+              <a:spcBef>
+                <a:spcPts val="1000"/>
+              </a:spcBef>
+              <a:spcAft>
+                <a:spcPts val="0"/>
+              </a:spcAft>
+              <a:buClr>
+                <a:schemeClr val="accent1"/>
+              </a:buClr>
+              <a:buSzPct val="80000"/>
+              <a:buFont typeface="Wingdings 3" charset="2"/>
+              <a:buChar char=""/>
+              <a:defRPr sz="1400" b="0" i="0" kern="1200">
+                <a:solidFill>
+                  <a:schemeClr val="tx1"/>
+                </a:solidFill>
+                <a:latin typeface="+mj-lt"/>
+                <a:ea typeface="+mj-ea"/>
+                <a:cs typeface="+mj-cs"/>
+              </a:defRPr>
+            </a:lvl5pPr>
+            <a:lvl6pPr marL="2514600" indent="-228600" algn="l" defTabSz="457200" rtl="0" eaLnBrk="1" latinLnBrk="0" hangingPunct="1">
+              <a:spcBef>
+                <a:spcPts val="1000"/>
+              </a:spcBef>
+              <a:spcAft>
+                <a:spcPts val="0"/>
+              </a:spcAft>
+              <a:buClr>
+                <a:schemeClr val="accent1"/>
+              </a:buClr>
+              <a:buSzPct val="80000"/>
+              <a:buFont typeface="Wingdings 3" charset="2"/>
+              <a:buChar char=""/>
+              <a:defRPr sz="1400" b="0" i="0" kern="1200">
+                <a:solidFill>
+                  <a:schemeClr val="tx1"/>
+                </a:solidFill>
+                <a:latin typeface="+mj-lt"/>
+                <a:ea typeface="+mj-ea"/>
+                <a:cs typeface="+mj-cs"/>
+              </a:defRPr>
+            </a:lvl6pPr>
+            <a:lvl7pPr marL="2971800" indent="-228600" algn="l" defTabSz="457200" rtl="0" eaLnBrk="1" latinLnBrk="0" hangingPunct="1">
+              <a:spcBef>
+                <a:spcPts val="1000"/>
+              </a:spcBef>
+              <a:spcAft>
+                <a:spcPts val="0"/>
+              </a:spcAft>
+              <a:buClr>
+                <a:schemeClr val="accent1"/>
+              </a:buClr>
+              <a:buSzPct val="80000"/>
+              <a:buFont typeface="Wingdings 3" charset="2"/>
+              <a:buChar char=""/>
+              <a:defRPr sz="1400" b="0" i="0" kern="1200">
+                <a:solidFill>
+                  <a:schemeClr val="tx1"/>
+                </a:solidFill>
+                <a:latin typeface="+mj-lt"/>
+                <a:ea typeface="+mj-ea"/>
+                <a:cs typeface="+mj-cs"/>
+              </a:defRPr>
+            </a:lvl7pPr>
+            <a:lvl8pPr marL="3429000" indent="-228600" algn="l" defTabSz="457200" rtl="0" eaLnBrk="1" latinLnBrk="0" hangingPunct="1">
+              <a:spcBef>
+                <a:spcPts val="1000"/>
+              </a:spcBef>
+              <a:spcAft>
+                <a:spcPts val="0"/>
+              </a:spcAft>
+              <a:buClr>
+                <a:schemeClr val="accent1"/>
+              </a:buClr>
+              <a:buSzPct val="80000"/>
+              <a:buFont typeface="Wingdings 3" charset="2"/>
+              <a:buChar char=""/>
+              <a:defRPr sz="1400" b="0" i="0" kern="1200">
+                <a:solidFill>
+                  <a:schemeClr val="tx1"/>
+                </a:solidFill>
+                <a:latin typeface="+mj-lt"/>
+                <a:ea typeface="+mj-ea"/>
+                <a:cs typeface="+mj-cs"/>
+              </a:defRPr>
+            </a:lvl8pPr>
+            <a:lvl9pPr marL="3886200" indent="-228600" algn="l" defTabSz="457200" rtl="0" eaLnBrk="1" latinLnBrk="0" hangingPunct="1">
+              <a:spcBef>
+                <a:spcPts val="1000"/>
+              </a:spcBef>
+              <a:spcAft>
+                <a:spcPts val="0"/>
+              </a:spcAft>
+              <a:buClr>
+                <a:schemeClr val="accent1"/>
+              </a:buClr>
+              <a:buSzPct val="80000"/>
+              <a:buFont typeface="Wingdings 3" charset="2"/>
+              <a:buChar char=""/>
+              <a:defRPr sz="1400" b="0" i="0" kern="1200">
+                <a:solidFill>
+                  <a:schemeClr val="tx1"/>
+                </a:solidFill>
+                <a:latin typeface="+mj-lt"/>
+                <a:ea typeface="+mj-ea"/>
+                <a:cs typeface="+mj-cs"/>
+              </a:defRPr>
+            </a:lvl9pPr>
+          </a:lstStyle>
+          <a:p>
+            <a:r>
+              <a:rPr lang="en-SG" dirty="0" smtClean="0"/>
+              <a:t>Framework</a:t>
+            </a:r>
+          </a:p>
+          <a:p>
+            <a:pPr lvl="1"/>
+            <a:r>
+              <a:rPr lang="en-SG" dirty="0" smtClean="0"/>
+              <a:t>Menu system</a:t>
+            </a:r>
+          </a:p>
+          <a:p>
+            <a:pPr lvl="1"/>
+            <a:r>
+              <a:rPr lang="en-SG" dirty="0" smtClean="0"/>
+              <a:t>Player class</a:t>
+            </a:r>
+          </a:p>
+          <a:p>
+            <a:r>
+              <a:rPr lang="en-SG" dirty="0" smtClean="0"/>
+              <a:t>Models</a:t>
+            </a:r>
+          </a:p>
+          <a:p>
+            <a:pPr lvl="1"/>
+            <a:r>
+              <a:rPr lang="en-SG" dirty="0" smtClean="0"/>
+              <a:t>Props</a:t>
+            </a:r>
+          </a:p>
+          <a:p>
+            <a:pPr lvl="1"/>
+            <a:r>
+              <a:rPr lang="en-SG" dirty="0" smtClean="0"/>
+              <a:t>Items</a:t>
+            </a:r>
+          </a:p>
+          <a:p>
+            <a:r>
+              <a:rPr lang="en-SG" dirty="0" smtClean="0"/>
+              <a:t>Images</a:t>
+            </a:r>
+          </a:p>
+          <a:p>
+            <a:pPr lvl="1"/>
+            <a:r>
+              <a:rPr lang="en-SG" dirty="0" smtClean="0"/>
+              <a:t>Menu</a:t>
+            </a:r>
+          </a:p>
+          <a:p>
+            <a:pPr lvl="1"/>
+            <a:r>
+              <a:rPr lang="en-SG" dirty="0" smtClean="0"/>
+              <a:t>Props</a:t>
+            </a:r>
+          </a:p>
+          <a:p>
+            <a:pPr lvl="1"/>
+            <a:r>
+              <a:rPr lang="en-SG" dirty="0" smtClean="0"/>
+              <a:t>Items</a:t>
+            </a:r>
+          </a:p>
+          <a:p>
+            <a:pPr lvl="1"/>
+            <a:r>
+              <a:rPr lang="en-SG" dirty="0" smtClean="0"/>
+              <a:t>Invisibility</a:t>
+            </a:r>
+          </a:p>
+          <a:p>
+            <a:pPr lvl="1"/>
+            <a:r>
+              <a:rPr lang="en-SG" dirty="0" smtClean="0"/>
+              <a:t>Night Vision Goggles</a:t>
+            </a:r>
+            <a:endParaRPr lang="en-SG" dirty="0" smtClean="0"/>
           </a:p>
         </p:txBody>
       </p:sp>
@@ -8069,7 +8418,11 @@
           <a:bodyPr/>
           <a:lstStyle/>
           <a:p>
-            <a:endParaRPr lang="en-SG"/>
+            <a:r>
+              <a:rPr lang="en-SG" dirty="0" smtClean="0"/>
+              <a:t>Bad coding practices</a:t>
+            </a:r>
+            <a:endParaRPr lang="en-SG" dirty="0"/>
           </a:p>
         </p:txBody>
       </p:sp>

</xml_diff>

<commit_message>
-Fixed missing NVG Cooldown -Added to new things learned
</commit_message>
<xml_diff>
--- a/State Penitentiary 3.pptx
+++ b/State Penitentiary 3.pptx
@@ -8419,11 +8419,7 @@
           <a:p>
             <a:r>
               <a:rPr lang="en-SG" dirty="0" smtClean="0"/>
-              <a:t>Bad coding </a:t>
-            </a:r>
-            <a:r>
-              <a:rPr lang="en-SG" dirty="0" smtClean="0"/>
-              <a:t>practices</a:t>
+              <a:t>Bad coding practices</a:t>
             </a:r>
           </a:p>
           <a:p>
@@ -8435,7 +8431,6 @@
               <a:rPr lang="en-SG" dirty="0" smtClean="0"/>
               <a:t>Hungarian Notation</a:t>
             </a:r>
-            <a:endParaRPr lang="en-SG" dirty="0" smtClean="0"/>
           </a:p>
           <a:p>
             <a:r>
@@ -8468,7 +8463,6 @@
               <a:rPr lang="en-SG" dirty="0" smtClean="0"/>
               <a:t>Debug and use call stack to find the error</a:t>
             </a:r>
-            <a:endParaRPr lang="en-SG" dirty="0" smtClean="0"/>
           </a:p>
           <a:p>
             <a:r>
@@ -8485,7 +8479,6 @@
               <a:rPr lang="en-SG" dirty="0" smtClean="0"/>
               <a:t>Frustum culling</a:t>
             </a:r>
-            <a:endParaRPr lang="en-SG" dirty="0" smtClean="0"/>
           </a:p>
           <a:p>
             <a:r>
@@ -8550,11 +8543,7 @@
           <a:p>
             <a:r>
               <a:rPr lang="en-SG" dirty="0" smtClean="0"/>
-              <a:t>New things </a:t>
-            </a:r>
-            <a:r>
-              <a:rPr lang="en-SG" dirty="0" smtClean="0"/>
-              <a:t>learned</a:t>
+              <a:t>New things learned</a:t>
             </a:r>
             <a:endParaRPr lang="en-SG" dirty="0"/>
           </a:p>
@@ -8591,6 +8580,29 @@
               <a:rPr lang="en-SG" dirty="0" smtClean="0"/>
               <a:t>AI waypoint generation &amp; Calculation based on generated values</a:t>
             </a:r>
+          </a:p>
+          <a:p>
+            <a:r>
+              <a:rPr lang="en-SG" dirty="0" smtClean="0"/>
+              <a:t>Interactions via Pythagoras’ theorem and magnitude</a:t>
+            </a:r>
+          </a:p>
+          <a:p>
+            <a:r>
+              <a:rPr lang="en-SG" dirty="0" smtClean="0"/>
+              <a:t>Rotation for animation using </a:t>
+            </a:r>
+            <a:r>
+              <a:rPr lang="en-SG" dirty="0" err="1" smtClean="0"/>
+              <a:t>DegreeToRadians</a:t>
+            </a:r>
+            <a:r>
+              <a:rPr lang="en-SG" dirty="0" smtClean="0"/>
+              <a:t>()</a:t>
+            </a:r>
+          </a:p>
+          <a:p>
+            <a:endParaRPr lang="en-SG" dirty="0" smtClean="0"/>
           </a:p>
           <a:p>
             <a:endParaRPr lang="en-SG" dirty="0" smtClean="0"/>
@@ -9154,15 +9166,7 @@
             </a:pPr>
             <a:r>
               <a:rPr lang="en-SG" dirty="0" smtClean="0"/>
-              <a:t>AI Field of </a:t>
-            </a:r>
-            <a:r>
-              <a:rPr lang="en-SG" dirty="0" smtClean="0"/>
-              <a:t>View/ </a:t>
-            </a:r>
-            <a:r>
-              <a:rPr lang="en-SG" dirty="0" smtClean="0"/>
-              <a:t>Visibility</a:t>
+              <a:t>AI Field of View/ Visibility</a:t>
             </a:r>
           </a:p>
           <a:p>

</xml_diff>